<commit_message>
Added C# 7.1 slides
</commit_message>
<xml_diff>
--- a/docs/What is new in CSharp 6.0 and 7.0.pptx
+++ b/docs/What is new in CSharp 6.0 and 7.0.pptx
@@ -5,10 +5,10 @@
     <p:sldMasterId id="2147483660" r:id="rId2"/>
   </p:sldMasterIdLst>
   <p:notesMasterIdLst>
-    <p:notesMasterId r:id="rId55"/>
+    <p:notesMasterId r:id="rId59"/>
   </p:notesMasterIdLst>
   <p:handoutMasterIdLst>
-    <p:handoutMasterId r:id="rId56"/>
+    <p:handoutMasterId r:id="rId60"/>
   </p:handoutMasterIdLst>
   <p:sldIdLst>
     <p:sldId id="274" r:id="rId3"/>
@@ -60,9 +60,13 @@
     <p:sldId id="456" r:id="rId49"/>
     <p:sldId id="457" r:id="rId50"/>
     <p:sldId id="458" r:id="rId51"/>
-    <p:sldId id="466" r:id="rId52"/>
-    <p:sldId id="400" r:id="rId53"/>
-    <p:sldId id="399" r:id="rId54"/>
+    <p:sldId id="468" r:id="rId52"/>
+    <p:sldId id="467" r:id="rId53"/>
+    <p:sldId id="469" r:id="rId54"/>
+    <p:sldId id="470" r:id="rId55"/>
+    <p:sldId id="466" r:id="rId56"/>
+    <p:sldId id="400" r:id="rId57"/>
+    <p:sldId id="399" r:id="rId58"/>
   </p:sldIdLst>
   <p:sldSz cx="12188825" cy="6858000"/>
   <p:notesSz cx="6858000" cy="9144000"/>
@@ -227,6 +231,10 @@
             <p14:sldId id="456"/>
             <p14:sldId id="457"/>
             <p14:sldId id="458"/>
+            <p14:sldId id="468"/>
+            <p14:sldId id="467"/>
+            <p14:sldId id="469"/>
+            <p14:sldId id="470"/>
           </p14:sldIdLst>
         </p14:section>
         <p14:section name="Questions" id="{10E03AB1-9AA8-4E86-9A64-D741901E50A2}">
@@ -357,7 +365,7 @@
             <a:fld id="{FE5B4EDC-59C0-49C7-8ADA-5A781B329E02}" type="datetimeFigureOut">
               <a:rPr lang="en-US"/>
               <a:pPr/>
-              <a:t>07-May-17</a:t>
+              <a:t>08-May-17</a:t>
             </a:fld>
             <a:endParaRPr dirty="0"/>
           </a:p>
@@ -556,7 +564,7 @@
             <a:fld id="{F2D8D46A-B586-417D-BFBD-8C8FE0AAF762}" type="datetimeFigureOut">
               <a:rPr lang="en-US" smtClean="0"/>
               <a:pPr/>
-              <a:t>07-May-17</a:t>
+              <a:t>08-May-17</a:t>
             </a:fld>
             <a:endParaRPr lang="en-US"/>
           </a:p>
@@ -1551,7 +1559,7 @@
             <a:fld id="{3EBA5BD7-F043-4D1B-AA17-CD412FC534DE}" type="slidenum">
               <a:rPr lang="en-US" smtClean="0"/>
               <a:pPr/>
-              <a:t>51</a:t>
+              <a:t>55</a:t>
             </a:fld>
             <a:endParaRPr lang="en-US" dirty="0"/>
           </a:p>
@@ -1720,7 +1728,7 @@
                 </a:solidFill>
               </a:rPr>
               <a:pPr/>
-              <a:t>52</a:t>
+              <a:t>56</a:t>
             </a:fld>
             <a:endParaRPr lang="en-US" dirty="0">
               <a:solidFill>
@@ -3626,8 +3634,8 @@
         </p:nvSpPr>
         <p:spPr>
           <a:xfrm>
-            <a:off x="684212" y="5840965"/>
-            <a:ext cx="3187613" cy="331235"/>
+            <a:off x="684212" y="5846223"/>
+            <a:ext cx="3187613" cy="320720"/>
           </a:xfrm>
         </p:spPr>
         <p:txBody>
@@ -3638,7 +3646,7 @@
               <a:rPr lang="en-US" dirty="0">
                 <a:hlinkClick r:id="rId4"/>
               </a:rPr>
-              <a:t>http://softuni.bg</a:t>
+              <a:t>https://softuni.bg</a:t>
             </a:r>
             <a:endParaRPr lang="en-US" dirty="0"/>
           </a:p>
@@ -10099,7 +10107,15 @@
             </a:pPr>
             <a:r>
               <a:rPr lang="en-US" dirty="0"/>
-              <a:t>What's new in C# 6.0?</a:t>
+              <a:t>What's new in C# 6.0</a:t>
+            </a:r>
+            <a:r>
+              <a:rPr lang="bg-BG" dirty="0"/>
+              <a:t> (2015)</a:t>
+            </a:r>
+            <a:r>
+              <a:rPr lang="en-US" dirty="0"/>
+              <a:t>?</a:t>
             </a:r>
           </a:p>
           <a:p>
@@ -10139,7 +10155,15 @@
             </a:pPr>
             <a:r>
               <a:rPr lang="en-US" dirty="0"/>
-              <a:t>What's new in C# 7.0?</a:t>
+              <a:t>What's new in C# 7.0</a:t>
+            </a:r>
+            <a:r>
+              <a:rPr lang="bg-BG" dirty="0"/>
+              <a:t> (2017)</a:t>
+            </a:r>
+            <a:r>
+              <a:rPr lang="en-US" dirty="0"/>
+              <a:t>?</a:t>
             </a:r>
           </a:p>
           <a:p>
@@ -10150,7 +10174,7 @@
             </a:pPr>
             <a:r>
               <a:rPr lang="en-US" dirty="0"/>
-              <a:t>Literal Improvements, Local Functions, Tuples</a:t>
+              <a:t>Literals, Local Functions, Tuples, Deconstruction</a:t>
             </a:r>
           </a:p>
           <a:p>
@@ -10161,19 +10185,36 @@
             </a:pPr>
             <a:r>
               <a:rPr lang="en-US" dirty="0"/>
-              <a:t>Ref Returns and Locals, out Variables, Pattern Matching</a:t>
-            </a:r>
-          </a:p>
-          <a:p>
-            <a:pPr marL="761946" lvl="1" indent="-457200">
+              <a:t>Ref Returns and Locals, out Variables, Pattern Matching, throw</a:t>
+            </a:r>
+          </a:p>
+          <a:p>
+            <a:pPr marL="446088" indent="-446088">
+              <a:lnSpc>
+                <a:spcPts val="4000"/>
+              </a:lnSpc>
+              <a:buFontTx/>
+              <a:buAutoNum type="arabicPeriod"/>
+            </a:pPr>
+            <a:r>
+              <a:rPr lang="en-US" dirty="0"/>
+              <a:t>Plans for C# 7.1 </a:t>
+            </a:r>
+            <a:r>
+              <a:rPr lang="en-US" dirty="0">
+                <a:sym typeface="Wingdings" panose="05000000000000000000" pitchFamily="2" charset="2"/>
+              </a:rPr>
+              <a:t></a:t>
+            </a:r>
+            <a:endParaRPr lang="en-US" dirty="0"/>
+          </a:p>
+          <a:p>
+            <a:pPr marL="457200" indent="-457200">
               <a:lnSpc>
                 <a:spcPts val="4000"/>
               </a:lnSpc>
             </a:pPr>
-            <a:r>
-              <a:rPr lang="en-US" dirty="0"/>
-              <a:t>Throw expressions, Deconstruction, etc.</a:t>
-            </a:r>
+            <a:endParaRPr lang="en-US" sz="3200" dirty="0"/>
           </a:p>
         </p:txBody>
       </p:sp>
@@ -15863,7 +15904,41 @@
                 </a:effectLst>
                 <a:latin typeface="Consolas" pitchFamily="49" charset="0"/>
               </a:rPr>
-              <a:t>public static void Deconstruct(</a:t>
+              <a:t>public static void </a:t>
+            </a:r>
+            <a:r>
+              <a:rPr lang="en-US" sz="2000" b="1" noProof="1">
+                <a:solidFill>
+                  <a:schemeClr val="accent4">
+                    <a:lumMod val="75000"/>
+                  </a:schemeClr>
+                </a:solidFill>
+                <a:effectLst>
+                  <a:outerShdw blurRad="38100" dist="38100" dir="2700000" algn="tl">
+                    <a:srgbClr val="000000">
+                      <a:alpha val="43137"/>
+                    </a:srgbClr>
+                  </a:outerShdw>
+                </a:effectLst>
+                <a:latin typeface="Consolas" pitchFamily="49" charset="0"/>
+              </a:rPr>
+              <a:t>Deconstruct</a:t>
+            </a:r>
+            <a:r>
+              <a:rPr lang="en-US" sz="2000" b="1" noProof="1">
+                <a:solidFill>
+                  <a:srgbClr val="8CF4F2"/>
+                </a:solidFill>
+                <a:effectLst>
+                  <a:outerShdw blurRad="38100" dist="38100" dir="2700000" algn="tl">
+                    <a:srgbClr val="000000">
+                      <a:alpha val="43137"/>
+                    </a:srgbClr>
+                  </a:outerShdw>
+                </a:effectLst>
+                <a:latin typeface="Consolas" pitchFamily="49" charset="0"/>
+              </a:rPr>
+              <a:t>(</a:t>
             </a:r>
           </a:p>
           <a:p>
@@ -18022,7 +18097,8 @@
               </a:prstGeom>
               <a:solidFill>
                 <a:schemeClr val="accent4">
-                  <a:lumMod val="75000"/>
+                  <a:lumMod val="40000"/>
+                  <a:lumOff val="60000"/>
                 </a:schemeClr>
               </a:solidFill>
             </p:spPr>
@@ -18168,7 +18244,8 @@
             </a:prstGeom>
             <a:solidFill>
               <a:schemeClr val="accent4">
-                <a:lumMod val="75000"/>
+                <a:lumMod val="40000"/>
+                <a:lumOff val="60000"/>
               </a:schemeClr>
             </a:solidFill>
           </p:spPr>
@@ -18192,6 +18269,18 @@
             <a:p>
               <a:pPr algn="ctr"/>
               <a:r>
+                <a:rPr lang="bg-BG" sz="1900" b="1" dirty="0">
+                  <a:effectLst>
+                    <a:outerShdw blurRad="38100" dist="38100" dir="2700000" algn="tl">
+                      <a:srgbClr val="000000">
+                        <a:alpha val="43137"/>
+                      </a:srgbClr>
+                    </a:outerShdw>
+                  </a:effectLst>
+                </a:rPr>
+                <a:t>10</a:t>
+              </a:r>
+              <a:r>
                 <a:rPr lang="en-US" sz="1900" b="1" dirty="0">
                   <a:effectLst>
                     <a:outerShdw blurRad="38100" dist="38100" dir="2700000" algn="tl">
@@ -18201,7 +18290,7 @@
                     </a:outerShdw>
                   </a:effectLst>
                 </a:rPr>
-                <a:t>5 planned features</a:t>
+                <a:t> planned features</a:t>
               </a:r>
             </a:p>
           </p:txBody>
@@ -18263,7 +18352,7 @@
       </p:grpSpPr>
       <p:sp>
         <p:nvSpPr>
-          <p:cNvPr id="4" name="Title 3"/>
+          <p:cNvPr id="5" name="Title 4"/>
           <p:cNvSpPr>
             <a:spLocks noGrp="1"/>
           </p:cNvSpPr>
@@ -18273,8 +18362,8 @@
         </p:nvSpPr>
         <p:spPr>
           <a:xfrm>
-            <a:off x="912812" y="381000"/>
-            <a:ext cx="10363200" cy="1665447"/>
+            <a:off x="912812" y="685800"/>
+            <a:ext cx="10363200" cy="820600"/>
           </a:xfrm>
         </p:spPr>
         <p:txBody>
@@ -18282,16 +18371,43 @@
           <a:lstStyle/>
           <a:p>
             <a:r>
-              <a:rPr lang="en-US" sz="11500" dirty="0">
-                <a:effectLst>
-                  <a:outerShdw blurRad="38100" dist="38100" dir="2700000" algn="tl">
-                    <a:srgbClr val="000000">
-                      <a:alpha val="43137"/>
-                    </a:srgbClr>
-                  </a:outerShdw>
-                </a:effectLst>
-              </a:rPr>
-              <a:t>Questions</a:t>
+              <a:rPr lang="en-US" dirty="0"/>
+              <a:t>Plans for C# 7.1</a:t>
+            </a:r>
+          </a:p>
+        </p:txBody>
+      </p:sp>
+      <p:sp>
+        <p:nvSpPr>
+          <p:cNvPr id="6" name="Text Placeholder 5"/>
+          <p:cNvSpPr>
+            <a:spLocks noGrp="1"/>
+          </p:cNvSpPr>
+          <p:nvPr>
+            <p:ph type="body" idx="1"/>
+          </p:nvPr>
+        </p:nvSpPr>
+        <p:spPr>
+          <a:xfrm>
+            <a:off x="912812" y="1487768"/>
+            <a:ext cx="10363200" cy="654401"/>
+          </a:xfrm>
+        </p:spPr>
+        <p:txBody>
+          <a:bodyPr/>
+          <a:lstStyle/>
+          <a:p>
+            <a:r>
+              <a:rPr lang="en-US" sz="3600" dirty="0"/>
+              <a:t>Noting is official, nothing is implemented</a:t>
+            </a:r>
+            <a:r>
+              <a:rPr lang="bg-BG" sz="3600" dirty="0"/>
+              <a:t>, </a:t>
+            </a:r>
+            <a:r>
+              <a:rPr lang="en-US" sz="3600" dirty="0"/>
+              <a:t>yet</a:t>
             </a:r>
           </a:p>
         </p:txBody>
@@ -18320,6 +18436,2167 @@
               <a:rPr lang="en-US" smtClean="0"/>
               <a:pPr/>
               <a:t>50</a:t>
+            </a:fld>
+            <a:endParaRPr lang="en-US" dirty="0"/>
+          </a:p>
+        </p:txBody>
+      </p:sp>
+      <p:pic>
+        <p:nvPicPr>
+          <p:cNvPr id="1026" name="Picture 2" descr="https://smilecreations-music-label.com/wp-content/uploads/2016/07/new2.png"/>
+          <p:cNvPicPr>
+            <a:picLocks noChangeAspect="1" noChangeArrowheads="1"/>
+          </p:cNvPicPr>
+          <p:nvPr/>
+        </p:nvPicPr>
+        <p:blipFill>
+          <a:blip r:embed="rId2">
+            <a:extLst>
+              <a:ext uri="{28A0092B-C50C-407E-A947-70E740481C1C}">
+                <a14:useLocalDpi xmlns:a14="http://schemas.microsoft.com/office/drawing/2010/main" val="0"/>
+              </a:ext>
+            </a:extLst>
+          </a:blip>
+          <a:srcRect/>
+          <a:stretch>
+            <a:fillRect/>
+          </a:stretch>
+        </p:blipFill>
+        <p:spPr bwMode="auto">
+          <a:xfrm>
+            <a:off x="2509548" y="2514600"/>
+            <a:ext cx="7169727" cy="3429000"/>
+          </a:xfrm>
+          <a:prstGeom prst="rect">
+            <a:avLst/>
+          </a:prstGeom>
+          <a:noFill/>
+          <a:extLst>
+            <a:ext uri="{909E8E84-426E-40DD-AFC4-6F175D3DCCD1}">
+              <a14:hiddenFill xmlns:a14="http://schemas.microsoft.com/office/drawing/2010/main">
+                <a:solidFill>
+                  <a:srgbClr val="FFFFFF"/>
+                </a:solidFill>
+              </a14:hiddenFill>
+            </a:ext>
+          </a:extLst>
+        </p:spPr>
+      </p:pic>
+    </p:spTree>
+    <p:extLst>
+      <p:ext uri="{BB962C8B-B14F-4D97-AF65-F5344CB8AC3E}">
+        <p14:creationId xmlns:p14="http://schemas.microsoft.com/office/powerpoint/2010/main" val="2333379402"/>
+      </p:ext>
+    </p:extLst>
+  </p:cSld>
+  <p:clrMapOvr>
+    <a:masterClrMapping/>
+  </p:clrMapOvr>
+</p:sld>
+</file>
+
+<file path=ppt/slides/slide51.xml><?xml version="1.0" encoding="utf-8"?>
+<p:sld xmlns:a="http://schemas.openxmlformats.org/drawingml/2006/main" xmlns:r="http://schemas.openxmlformats.org/officeDocument/2006/relationships" xmlns:p="http://schemas.openxmlformats.org/presentationml/2006/main">
+  <p:cSld>
+    <p:bg>
+      <p:bgPr>
+        <a:blipFill dpi="0" rotWithShape="1">
+          <a:blip r:embed="rId3">
+            <a:lum/>
+          </a:blip>
+          <a:srcRect/>
+          <a:stretch>
+            <a:fillRect/>
+          </a:stretch>
+        </a:blipFill>
+        <a:effectLst/>
+      </p:bgPr>
+    </p:bg>
+    <p:spTree>
+      <p:nvGrpSpPr>
+        <p:cNvPr id="1" name=""/>
+        <p:cNvGrpSpPr/>
+        <p:nvPr/>
+      </p:nvGrpSpPr>
+      <p:grpSpPr>
+        <a:xfrm>
+          <a:off x="0" y="0"/>
+          <a:ext cx="0" cy="0"/>
+          <a:chOff x="0" y="0"/>
+          <a:chExt cx="0" cy="0"/>
+        </a:xfrm>
+      </p:grpSpPr>
+      <p:sp>
+        <p:nvSpPr>
+          <p:cNvPr id="2" name="Slide Number Placeholder 1"/>
+          <p:cNvSpPr>
+            <a:spLocks noGrp="1"/>
+          </p:cNvSpPr>
+          <p:nvPr>
+            <p:ph type="sldNum" sz="quarter" idx="4"/>
+          </p:nvPr>
+        </p:nvSpPr>
+        <p:spPr/>
+        <p:txBody>
+          <a:bodyPr/>
+          <a:lstStyle/>
+          <a:p>
+            <a:fld id="{C014DD1E-5D91-48A3-AD6D-45FBA980D106}" type="slidenum">
+              <a:rPr lang="en-US" smtClean="0"/>
+              <a:pPr/>
+              <a:t>51</a:t>
+            </a:fld>
+            <a:endParaRPr lang="en-US" dirty="0"/>
+          </a:p>
+        </p:txBody>
+      </p:sp>
+      <p:sp>
+        <p:nvSpPr>
+          <p:cNvPr id="3" name="Content Placeholder 2"/>
+          <p:cNvSpPr>
+            <a:spLocks noGrp="1"/>
+          </p:cNvSpPr>
+          <p:nvPr>
+            <p:ph idx="1"/>
+          </p:nvPr>
+        </p:nvSpPr>
+        <p:spPr/>
+        <p:txBody>
+          <a:bodyPr/>
+          <a:lstStyle/>
+          <a:p>
+            <a:r>
+              <a:rPr lang="en-US" dirty="0"/>
+              <a:t>List of all: </a:t>
+            </a:r>
+            <a:r>
+              <a:rPr lang="en-US" dirty="0">
+                <a:hlinkClick r:id="rId4"/>
+              </a:rPr>
+              <a:t>https://github.com/dotnet/csharplang/milestone/5</a:t>
+            </a:r>
+            <a:endParaRPr lang="en-US" dirty="0"/>
+          </a:p>
+          <a:p>
+            <a:r>
+              <a:rPr lang="en-US" dirty="0" err="1"/>
+              <a:t>Async</a:t>
+            </a:r>
+            <a:r>
+              <a:rPr lang="en-US" dirty="0"/>
+              <a:t> Main</a:t>
+            </a:r>
+          </a:p>
+          <a:p>
+            <a:endParaRPr lang="en-US" dirty="0"/>
+          </a:p>
+          <a:p>
+            <a:r>
+              <a:rPr lang="en-US" dirty="0"/>
+              <a:t>"default" literal</a:t>
+            </a:r>
+            <a:endParaRPr lang="bg-BG" dirty="0"/>
+          </a:p>
+          <a:p>
+            <a:endParaRPr lang="bg-BG" dirty="0"/>
+          </a:p>
+          <a:p>
+            <a:endParaRPr lang="bg-BG" dirty="0"/>
+          </a:p>
+          <a:p>
+            <a:r>
+              <a:rPr lang="en-US" dirty="0"/>
+              <a:t>Nullable-Enhanced Common Type</a:t>
+            </a:r>
+            <a:endParaRPr lang="bg-BG" dirty="0"/>
+          </a:p>
+          <a:p>
+            <a:endParaRPr lang="bg-BG" dirty="0"/>
+          </a:p>
+          <a:p>
+            <a:endParaRPr lang="en-US" dirty="0"/>
+          </a:p>
+          <a:p>
+            <a:endParaRPr lang="en-US" dirty="0"/>
+          </a:p>
+        </p:txBody>
+      </p:sp>
+      <p:sp>
+        <p:nvSpPr>
+          <p:cNvPr id="4" name="Title 3"/>
+          <p:cNvSpPr>
+            <a:spLocks noGrp="1"/>
+          </p:cNvSpPr>
+          <p:nvPr>
+            <p:ph type="title"/>
+          </p:nvPr>
+        </p:nvSpPr>
+        <p:spPr/>
+        <p:txBody>
+          <a:bodyPr/>
+          <a:lstStyle/>
+          <a:p>
+            <a:r>
+              <a:rPr lang="en-US" dirty="0"/>
+              <a:t>Plans for C# 7.1</a:t>
+            </a:r>
+          </a:p>
+        </p:txBody>
+      </p:sp>
+      <p:sp>
+        <p:nvSpPr>
+          <p:cNvPr id="5" name="Rectangle 4"/>
+          <p:cNvSpPr>
+            <a:spLocks noChangeArrowheads="1"/>
+          </p:cNvSpPr>
+          <p:nvPr/>
+        </p:nvSpPr>
+        <p:spPr bwMode="auto">
+          <a:xfrm>
+            <a:off x="1062631" y="2514600"/>
+            <a:ext cx="10060385" cy="707886"/>
+          </a:xfrm>
+          <a:prstGeom prst="rect">
+            <a:avLst/>
+          </a:prstGeom>
+          <a:solidFill>
+            <a:schemeClr val="accent5">
+              <a:lumMod val="40000"/>
+              <a:lumOff val="60000"/>
+              <a:alpha val="15000"/>
+            </a:schemeClr>
+          </a:solidFill>
+          <a:ln w="12700">
+            <a:solidFill>
+              <a:schemeClr val="accent5">
+                <a:lumMod val="60000"/>
+                <a:lumOff val="40000"/>
+              </a:schemeClr>
+            </a:solidFill>
+          </a:ln>
+        </p:spPr>
+        <p:txBody>
+          <a:bodyPr wrap="square">
+            <a:spAutoFit/>
+          </a:bodyPr>
+          <a:lstStyle/>
+          <a:p>
+            <a:r>
+              <a:rPr lang="en-US" sz="2000" b="1" noProof="1">
+                <a:solidFill>
+                  <a:srgbClr val="8CF4F2"/>
+                </a:solidFill>
+                <a:effectLst>
+                  <a:outerShdw blurRad="38100" dist="38100" dir="2700000" algn="tl">
+                    <a:srgbClr val="000000">
+                      <a:alpha val="43137"/>
+                    </a:srgbClr>
+                  </a:outerShdw>
+                </a:effectLst>
+                <a:latin typeface="Consolas" pitchFamily="49" charset="0"/>
+              </a:rPr>
+              <a:t>static </a:t>
+            </a:r>
+            <a:r>
+              <a:rPr lang="en-US" sz="2000" b="1" noProof="1">
+                <a:solidFill>
+                  <a:schemeClr val="accent4">
+                    <a:lumMod val="75000"/>
+                  </a:schemeClr>
+                </a:solidFill>
+                <a:effectLst>
+                  <a:outerShdw blurRad="38100" dist="38100" dir="2700000" algn="tl">
+                    <a:srgbClr val="000000">
+                      <a:alpha val="43137"/>
+                    </a:srgbClr>
+                  </a:outerShdw>
+                </a:effectLst>
+                <a:latin typeface="Consolas" pitchFamily="49" charset="0"/>
+              </a:rPr>
+              <a:t>async Task </a:t>
+            </a:r>
+            <a:r>
+              <a:rPr lang="en-US" sz="2000" b="1" noProof="1">
+                <a:solidFill>
+                  <a:srgbClr val="8CF4F2"/>
+                </a:solidFill>
+                <a:effectLst>
+                  <a:outerShdw blurRad="38100" dist="38100" dir="2700000" algn="tl">
+                    <a:srgbClr val="000000">
+                      <a:alpha val="43137"/>
+                    </a:srgbClr>
+                  </a:outerShdw>
+                </a:effectLst>
+                <a:latin typeface="Consolas" pitchFamily="49" charset="0"/>
+              </a:rPr>
+              <a:t>Main(string[] args) =&gt;</a:t>
+            </a:r>
+          </a:p>
+          <a:p>
+            <a:r>
+              <a:rPr lang="en-US" sz="2000" b="1" noProof="1">
+                <a:solidFill>
+                  <a:srgbClr val="8CF4F2"/>
+                </a:solidFill>
+                <a:effectLst>
+                  <a:outerShdw blurRad="38100" dist="38100" dir="2700000" algn="tl">
+                    <a:srgbClr val="000000">
+                      <a:alpha val="43137"/>
+                    </a:srgbClr>
+                  </a:outerShdw>
+                </a:effectLst>
+                <a:latin typeface="Consolas" pitchFamily="49" charset="0"/>
+              </a:rPr>
+              <a:t>    Console.WriteLine(await new HttpClient().GetStringAsync(args[0]));</a:t>
+            </a:r>
+          </a:p>
+        </p:txBody>
+      </p:sp>
+      <p:sp>
+        <p:nvSpPr>
+          <p:cNvPr id="7" name="Rectangle 6"/>
+          <p:cNvSpPr>
+            <a:spLocks noChangeArrowheads="1"/>
+          </p:cNvSpPr>
+          <p:nvPr/>
+        </p:nvSpPr>
+        <p:spPr bwMode="auto">
+          <a:xfrm>
+            <a:off x="1062631" y="3924245"/>
+            <a:ext cx="10060385" cy="1323439"/>
+          </a:xfrm>
+          <a:prstGeom prst="rect">
+            <a:avLst/>
+          </a:prstGeom>
+          <a:solidFill>
+            <a:schemeClr val="accent5">
+              <a:lumMod val="40000"/>
+              <a:lumOff val="60000"/>
+              <a:alpha val="15000"/>
+            </a:schemeClr>
+          </a:solidFill>
+          <a:ln w="12700">
+            <a:solidFill>
+              <a:schemeClr val="accent5">
+                <a:lumMod val="60000"/>
+                <a:lumOff val="40000"/>
+              </a:schemeClr>
+            </a:solidFill>
+          </a:ln>
+        </p:spPr>
+        <p:txBody>
+          <a:bodyPr wrap="square">
+            <a:spAutoFit/>
+          </a:bodyPr>
+          <a:lstStyle/>
+          <a:p>
+            <a:r>
+              <a:rPr lang="en-US" sz="2000" b="1" noProof="1">
+                <a:solidFill>
+                  <a:srgbClr val="8CF4F2"/>
+                </a:solidFill>
+                <a:effectLst>
+                  <a:outerShdw blurRad="38100" dist="38100" dir="2700000" algn="tl">
+                    <a:srgbClr val="000000">
+                      <a:alpha val="43137"/>
+                    </a:srgbClr>
+                  </a:outerShdw>
+                </a:effectLst>
+                <a:latin typeface="Consolas" pitchFamily="49" charset="0"/>
+              </a:rPr>
+              <a:t>int x = </a:t>
+            </a:r>
+            <a:r>
+              <a:rPr lang="en-US" sz="2000" b="1" noProof="1">
+                <a:solidFill>
+                  <a:schemeClr val="accent4">
+                    <a:lumMod val="75000"/>
+                  </a:schemeClr>
+                </a:solidFill>
+                <a:effectLst>
+                  <a:outerShdw blurRad="38100" dist="38100" dir="2700000" algn="tl">
+                    <a:srgbClr val="000000">
+                      <a:alpha val="43137"/>
+                    </a:srgbClr>
+                  </a:outerShdw>
+                </a:effectLst>
+                <a:latin typeface="Consolas" pitchFamily="49" charset="0"/>
+              </a:rPr>
+              <a:t>default</a:t>
+            </a:r>
+            <a:r>
+              <a:rPr lang="en-US" sz="2000" b="1" noProof="1">
+                <a:solidFill>
+                  <a:srgbClr val="8CF4F2"/>
+                </a:solidFill>
+                <a:effectLst>
+                  <a:outerShdw blurRad="38100" dist="38100" dir="2700000" algn="tl">
+                    <a:srgbClr val="000000">
+                      <a:alpha val="43137"/>
+                    </a:srgbClr>
+                  </a:outerShdw>
+                </a:effectLst>
+                <a:latin typeface="Consolas" pitchFamily="49" charset="0"/>
+              </a:rPr>
+              <a:t>; // Instead of </a:t>
+            </a:r>
+            <a:r>
+              <a:rPr lang="en-US" sz="2000" b="1" noProof="1">
+                <a:solidFill>
+                  <a:schemeClr val="accent4">
+                    <a:lumMod val="75000"/>
+                  </a:schemeClr>
+                </a:solidFill>
+                <a:effectLst>
+                  <a:outerShdw blurRad="38100" dist="38100" dir="2700000" algn="tl">
+                    <a:srgbClr val="000000">
+                      <a:alpha val="43137"/>
+                    </a:srgbClr>
+                  </a:outerShdw>
+                </a:effectLst>
+                <a:latin typeface="Consolas" pitchFamily="49" charset="0"/>
+              </a:rPr>
+              <a:t>default(int)</a:t>
+            </a:r>
+            <a:r>
+              <a:rPr lang="en-US" sz="2000" b="1" noProof="1">
+                <a:solidFill>
+                  <a:srgbClr val="8CF4F2"/>
+                </a:solidFill>
+                <a:effectLst>
+                  <a:outerShdw blurRad="38100" dist="38100" dir="2700000" algn="tl">
+                    <a:srgbClr val="000000">
+                      <a:alpha val="43137"/>
+                    </a:srgbClr>
+                  </a:outerShdw>
+                </a:effectLst>
+                <a:latin typeface="Consolas" pitchFamily="49" charset="0"/>
+              </a:rPr>
+              <a:t> or 0</a:t>
+            </a:r>
+          </a:p>
+          <a:p>
+            <a:r>
+              <a:rPr lang="en-US" sz="2000" b="1" noProof="1">
+                <a:solidFill>
+                  <a:srgbClr val="8CF4F2"/>
+                </a:solidFill>
+                <a:effectLst>
+                  <a:outerShdw blurRad="38100" dist="38100" dir="2700000" algn="tl">
+                    <a:srgbClr val="000000">
+                      <a:alpha val="43137"/>
+                    </a:srgbClr>
+                  </a:outerShdw>
+                </a:effectLst>
+                <a:latin typeface="Consolas" pitchFamily="49" charset="0"/>
+              </a:rPr>
+              <a:t>return </a:t>
+            </a:r>
+            <a:r>
+              <a:rPr lang="en-US" sz="2000" b="1" noProof="1">
+                <a:solidFill>
+                  <a:schemeClr val="accent4">
+                    <a:lumMod val="75000"/>
+                  </a:schemeClr>
+                </a:solidFill>
+                <a:effectLst>
+                  <a:outerShdw blurRad="38100" dist="38100" dir="2700000" algn="tl">
+                    <a:srgbClr val="000000">
+                      <a:alpha val="43137"/>
+                    </a:srgbClr>
+                  </a:outerShdw>
+                </a:effectLst>
+                <a:latin typeface="Consolas" pitchFamily="49" charset="0"/>
+              </a:rPr>
+              <a:t>default</a:t>
+            </a:r>
+            <a:r>
+              <a:rPr lang="en-US" sz="2000" b="1" noProof="1">
+                <a:solidFill>
+                  <a:srgbClr val="8CF4F2"/>
+                </a:solidFill>
+                <a:effectLst>
+                  <a:outerShdw blurRad="38100" dist="38100" dir="2700000" algn="tl">
+                    <a:srgbClr val="000000">
+                      <a:alpha val="43137"/>
+                    </a:srgbClr>
+                  </a:outerShdw>
+                </a:effectLst>
+                <a:latin typeface="Consolas" pitchFamily="49" charset="0"/>
+              </a:rPr>
+              <a:t>;</a:t>
+            </a:r>
+          </a:p>
+          <a:p>
+            <a:r>
+              <a:rPr lang="en-US" sz="2000" b="1" noProof="1">
+                <a:solidFill>
+                  <a:srgbClr val="8CF4F2"/>
+                </a:solidFill>
+                <a:effectLst>
+                  <a:outerShdw blurRad="38100" dist="38100" dir="2700000" algn="tl">
+                    <a:srgbClr val="000000">
+                      <a:alpha val="43137"/>
+                    </a:srgbClr>
+                  </a:outerShdw>
+                </a:effectLst>
+                <a:latin typeface="Consolas" pitchFamily="49" charset="0"/>
+              </a:rPr>
+              <a:t>var x = flag ? </a:t>
+            </a:r>
+            <a:r>
+              <a:rPr lang="en-US" sz="2000" b="1" noProof="1">
+                <a:solidFill>
+                  <a:schemeClr val="accent4">
+                    <a:lumMod val="75000"/>
+                  </a:schemeClr>
+                </a:solidFill>
+                <a:effectLst>
+                  <a:outerShdw blurRad="38100" dist="38100" dir="2700000" algn="tl">
+                    <a:srgbClr val="000000">
+                      <a:alpha val="43137"/>
+                    </a:srgbClr>
+                  </a:outerShdw>
+                </a:effectLst>
+                <a:latin typeface="Consolas" pitchFamily="49" charset="0"/>
+              </a:rPr>
+              <a:t>default</a:t>
+            </a:r>
+            <a:r>
+              <a:rPr lang="en-US" sz="2000" b="1" noProof="1">
+                <a:solidFill>
+                  <a:srgbClr val="8CF4F2"/>
+                </a:solidFill>
+                <a:effectLst>
+                  <a:outerShdw blurRad="38100" dist="38100" dir="2700000" algn="tl">
+                    <a:srgbClr val="000000">
+                      <a:alpha val="43137"/>
+                    </a:srgbClr>
+                  </a:outerShdw>
+                </a:effectLst>
+                <a:latin typeface="Consolas" pitchFamily="49" charset="0"/>
+              </a:rPr>
+              <a:t> : SomeType.Empty;</a:t>
+            </a:r>
+          </a:p>
+          <a:p>
+            <a:r>
+              <a:rPr lang="en-US" sz="2000" b="1" noProof="1">
+                <a:solidFill>
+                  <a:srgbClr val="8CF4F2"/>
+                </a:solidFill>
+                <a:effectLst>
+                  <a:outerShdw blurRad="38100" dist="38100" dir="2700000" algn="tl">
+                    <a:srgbClr val="000000">
+                      <a:alpha val="43137"/>
+                    </a:srgbClr>
+                  </a:outerShdw>
+                </a:effectLst>
+                <a:latin typeface="Consolas" pitchFamily="49" charset="0"/>
+              </a:rPr>
+              <a:t>void Method(SomeType arrayOpt = </a:t>
+            </a:r>
+            <a:r>
+              <a:rPr lang="en-US" sz="2000" b="1" noProof="1">
+                <a:solidFill>
+                  <a:schemeClr val="accent4">
+                    <a:lumMod val="75000"/>
+                  </a:schemeClr>
+                </a:solidFill>
+                <a:effectLst>
+                  <a:outerShdw blurRad="38100" dist="38100" dir="2700000" algn="tl">
+                    <a:srgbClr val="000000">
+                      <a:alpha val="43137"/>
+                    </a:srgbClr>
+                  </a:outerShdw>
+                </a:effectLst>
+                <a:latin typeface="Consolas" pitchFamily="49" charset="0"/>
+              </a:rPr>
+              <a:t>default</a:t>
+            </a:r>
+            <a:r>
+              <a:rPr lang="en-US" sz="2000" b="1" noProof="1">
+                <a:solidFill>
+                  <a:srgbClr val="8CF4F2"/>
+                </a:solidFill>
+                <a:effectLst>
+                  <a:outerShdw blurRad="38100" dist="38100" dir="2700000" algn="tl">
+                    <a:srgbClr val="000000">
+                      <a:alpha val="43137"/>
+                    </a:srgbClr>
+                  </a:outerShdw>
+                </a:effectLst>
+                <a:latin typeface="Consolas" pitchFamily="49" charset="0"/>
+              </a:rPr>
+              <a:t>))</a:t>
+            </a:r>
+          </a:p>
+        </p:txBody>
+      </p:sp>
+      <p:sp>
+        <p:nvSpPr>
+          <p:cNvPr id="9" name="Rectangle 8"/>
+          <p:cNvSpPr>
+            <a:spLocks noChangeArrowheads="1"/>
+          </p:cNvSpPr>
+          <p:nvPr/>
+        </p:nvSpPr>
+        <p:spPr bwMode="auto">
+          <a:xfrm>
+            <a:off x="873422" y="5994148"/>
+            <a:ext cx="10441981" cy="400110"/>
+          </a:xfrm>
+          <a:prstGeom prst="rect">
+            <a:avLst/>
+          </a:prstGeom>
+          <a:solidFill>
+            <a:schemeClr val="accent5">
+              <a:lumMod val="40000"/>
+              <a:lumOff val="60000"/>
+              <a:alpha val="15000"/>
+            </a:schemeClr>
+          </a:solidFill>
+          <a:ln w="12700">
+            <a:solidFill>
+              <a:schemeClr val="accent5">
+                <a:lumMod val="60000"/>
+                <a:lumOff val="40000"/>
+              </a:schemeClr>
+            </a:solidFill>
+          </a:ln>
+        </p:spPr>
+        <p:txBody>
+          <a:bodyPr wrap="square">
+            <a:spAutoFit/>
+          </a:bodyPr>
+          <a:lstStyle/>
+          <a:p>
+            <a:r>
+              <a:rPr lang="fr-FR" sz="2000" b="1" noProof="1">
+                <a:solidFill>
+                  <a:srgbClr val="8CF4F2"/>
+                </a:solidFill>
+                <a:effectLst>
+                  <a:outerShdw blurRad="38100" dist="38100" dir="2700000" algn="tl">
+                    <a:srgbClr val="000000">
+                      <a:alpha val="43137"/>
+                    </a:srgbClr>
+                  </a:outerShdw>
+                </a:effectLst>
+                <a:latin typeface="Consolas" pitchFamily="49" charset="0"/>
+              </a:rPr>
+              <a:t>int? x = </a:t>
+            </a:r>
+            <a:r>
+              <a:rPr lang="fr-FR" sz="2000" b="1" noProof="1">
+                <a:solidFill>
+                  <a:schemeClr val="accent4">
+                    <a:lumMod val="75000"/>
+                  </a:schemeClr>
+                </a:solidFill>
+                <a:effectLst>
+                  <a:outerShdw blurRad="38100" dist="38100" dir="2700000" algn="tl">
+                    <a:srgbClr val="000000">
+                      <a:alpha val="43137"/>
+                    </a:srgbClr>
+                  </a:outerShdw>
+                </a:effectLst>
+                <a:latin typeface="Consolas" pitchFamily="49" charset="0"/>
+              </a:rPr>
+              <a:t>cond ? 42 : null</a:t>
+            </a:r>
+            <a:r>
+              <a:rPr lang="fr-FR" sz="2000" b="1" noProof="1">
+                <a:solidFill>
+                  <a:srgbClr val="8CF4F2"/>
+                </a:solidFill>
+                <a:effectLst>
+                  <a:outerShdw blurRad="38100" dist="38100" dir="2700000" algn="tl">
+                    <a:srgbClr val="000000">
+                      <a:alpha val="43137"/>
+                    </a:srgbClr>
+                  </a:outerShdw>
+                </a:effectLst>
+                <a:latin typeface="Consolas" pitchFamily="49" charset="0"/>
+              </a:rPr>
+              <a:t>; // Instead of int? x = cond ? 42 : (int?)null;</a:t>
+            </a:r>
+            <a:endParaRPr lang="en-US" sz="2000" b="1" noProof="1">
+              <a:solidFill>
+                <a:srgbClr val="8CF4F2"/>
+              </a:solidFill>
+              <a:effectLst>
+                <a:outerShdw blurRad="38100" dist="38100" dir="2700000" algn="tl">
+                  <a:srgbClr val="000000">
+                    <a:alpha val="43137"/>
+                  </a:srgbClr>
+                </a:outerShdw>
+              </a:effectLst>
+              <a:latin typeface="Consolas" pitchFamily="49" charset="0"/>
+            </a:endParaRPr>
+          </a:p>
+        </p:txBody>
+      </p:sp>
+    </p:spTree>
+    <p:extLst>
+      <p:ext uri="{BB962C8B-B14F-4D97-AF65-F5344CB8AC3E}">
+        <p14:creationId xmlns:p14="http://schemas.microsoft.com/office/powerpoint/2010/main" val="3662062306"/>
+      </p:ext>
+    </p:extLst>
+  </p:cSld>
+  <p:clrMapOvr>
+    <a:overrideClrMapping bg1="dk1" tx1="lt1" bg2="dk2" tx2="lt2" accent1="accent1" accent2="accent2" accent3="accent3" accent4="accent4" accent5="accent5" accent6="accent6" hlink="hlink" folHlink="folHlink"/>
+  </p:clrMapOvr>
+</p:sld>
+</file>
+
+<file path=ppt/slides/slide52.xml><?xml version="1.0" encoding="utf-8"?>
+<p:sld xmlns:a="http://schemas.openxmlformats.org/drawingml/2006/main" xmlns:r="http://schemas.openxmlformats.org/officeDocument/2006/relationships" xmlns:p="http://schemas.openxmlformats.org/presentationml/2006/main">
+  <p:cSld>
+    <p:spTree>
+      <p:nvGrpSpPr>
+        <p:cNvPr id="1" name=""/>
+        <p:cNvGrpSpPr/>
+        <p:nvPr/>
+      </p:nvGrpSpPr>
+      <p:grpSpPr>
+        <a:xfrm>
+          <a:off x="0" y="0"/>
+          <a:ext cx="0" cy="0"/>
+          <a:chOff x="0" y="0"/>
+          <a:chExt cx="0" cy="0"/>
+        </a:xfrm>
+      </p:grpSpPr>
+      <p:sp>
+        <p:nvSpPr>
+          <p:cNvPr id="2" name="Slide Number Placeholder 1"/>
+          <p:cNvSpPr>
+            <a:spLocks noGrp="1"/>
+          </p:cNvSpPr>
+          <p:nvPr>
+            <p:ph type="sldNum" sz="quarter" idx="4"/>
+          </p:nvPr>
+        </p:nvSpPr>
+        <p:spPr/>
+        <p:txBody>
+          <a:bodyPr/>
+          <a:lstStyle/>
+          <a:p>
+            <a:fld id="{C014DD1E-5D91-48A3-AD6D-45FBA980D106}" type="slidenum">
+              <a:rPr lang="en-US" smtClean="0"/>
+              <a:pPr/>
+              <a:t>52</a:t>
+            </a:fld>
+            <a:endParaRPr lang="en-US" dirty="0"/>
+          </a:p>
+        </p:txBody>
+      </p:sp>
+      <p:sp>
+        <p:nvSpPr>
+          <p:cNvPr id="3" name="Content Placeholder 2"/>
+          <p:cNvSpPr>
+            <a:spLocks noGrp="1"/>
+          </p:cNvSpPr>
+          <p:nvPr>
+            <p:ph idx="1"/>
+          </p:nvPr>
+        </p:nvSpPr>
+        <p:spPr>
+          <a:xfrm>
+            <a:off x="190413" y="1151121"/>
+            <a:ext cx="11804822" cy="5570355"/>
+          </a:xfrm>
+        </p:spPr>
+        <p:txBody>
+          <a:bodyPr/>
+          <a:lstStyle/>
+          <a:p>
+            <a:r>
+              <a:rPr lang="en-US" dirty="0"/>
+              <a:t>private protected – subclasses contained in the assembly</a:t>
+            </a:r>
+            <a:endParaRPr lang="bg-BG" dirty="0"/>
+          </a:p>
+          <a:p>
+            <a:endParaRPr lang="bg-BG" dirty="0"/>
+          </a:p>
+          <a:p>
+            <a:endParaRPr lang="bg-BG" dirty="0"/>
+          </a:p>
+          <a:p>
+            <a:endParaRPr lang="bg-BG" dirty="0"/>
+          </a:p>
+          <a:p>
+            <a:endParaRPr lang="bg-BG" dirty="0"/>
+          </a:p>
+          <a:p>
+            <a:endParaRPr lang="bg-BG" dirty="0"/>
+          </a:p>
+          <a:p>
+            <a:r>
+              <a:rPr lang="en-US" dirty="0"/>
+              <a:t>Discard for lambda parameters (_, _) =&gt;</a:t>
+            </a:r>
+          </a:p>
+          <a:p>
+            <a:endParaRPr lang="en-US" dirty="0"/>
+          </a:p>
+        </p:txBody>
+      </p:sp>
+      <p:sp>
+        <p:nvSpPr>
+          <p:cNvPr id="4" name="Title 3"/>
+          <p:cNvSpPr>
+            <a:spLocks noGrp="1"/>
+          </p:cNvSpPr>
+          <p:nvPr>
+            <p:ph type="title"/>
+          </p:nvPr>
+        </p:nvSpPr>
+        <p:spPr/>
+        <p:txBody>
+          <a:bodyPr/>
+          <a:lstStyle/>
+          <a:p>
+            <a:r>
+              <a:rPr lang="en-US" dirty="0"/>
+              <a:t>Plans for C# 7.1 (2)</a:t>
+            </a:r>
+          </a:p>
+        </p:txBody>
+      </p:sp>
+      <p:grpSp>
+        <p:nvGrpSpPr>
+          <p:cNvPr id="17" name="Group 16"/>
+          <p:cNvGrpSpPr/>
+          <p:nvPr/>
+        </p:nvGrpSpPr>
+        <p:grpSpPr>
+          <a:xfrm>
+            <a:off x="2211011" y="3581400"/>
+            <a:ext cx="2362200" cy="1600200"/>
+            <a:chOff x="6122029" y="3530263"/>
+            <a:chExt cx="2362200" cy="1600200"/>
+          </a:xfrm>
+        </p:grpSpPr>
+        <p:pic>
+          <p:nvPicPr>
+            <p:cNvPr id="18" name="Picture 6" descr="enter image description here"/>
+            <p:cNvPicPr>
+              <a:picLocks noChangeAspect="1" noChangeArrowheads="1"/>
+            </p:cNvPicPr>
+            <p:nvPr/>
+          </p:nvPicPr>
+          <p:blipFill rotWithShape="1">
+            <a:blip r:embed="rId2" cstate="print">
+              <a:extLst>
+                <a:ext uri="{28A0092B-C50C-407E-A947-70E740481C1C}">
+                  <a14:useLocalDpi xmlns:a14="http://schemas.microsoft.com/office/drawing/2010/main" val="0"/>
+                </a:ext>
+              </a:extLst>
+            </a:blip>
+            <a:srcRect l="12108" t="2871" r="13193" b="7289"/>
+            <a:stretch/>
+          </p:blipFill>
+          <p:spPr bwMode="auto">
+            <a:xfrm>
+              <a:off x="6122029" y="3530263"/>
+              <a:ext cx="2362200" cy="1600200"/>
+            </a:xfrm>
+            <a:prstGeom prst="rect">
+              <a:avLst/>
+            </a:prstGeom>
+            <a:noFill/>
+            <a:extLst>
+              <a:ext uri="{909E8E84-426E-40DD-AFC4-6F175D3DCCD1}">
+                <a14:hiddenFill xmlns:a14="http://schemas.microsoft.com/office/drawing/2010/main">
+                  <a:solidFill>
+                    <a:srgbClr val="FFFFFF"/>
+                  </a:solidFill>
+                </a14:hiddenFill>
+              </a:ext>
+            </a:extLst>
+          </p:spPr>
+        </p:pic>
+        <p:sp>
+          <p:nvSpPr>
+            <p:cNvPr id="19" name="TextBox 18"/>
+            <p:cNvSpPr txBox="1"/>
+            <p:nvPr/>
+          </p:nvSpPr>
+          <p:spPr>
+            <a:xfrm>
+              <a:off x="6530321" y="4643482"/>
+              <a:ext cx="1545616" cy="477054"/>
+            </a:xfrm>
+            <a:prstGeom prst="rect">
+              <a:avLst/>
+            </a:prstGeom>
+            <a:noFill/>
+          </p:spPr>
+          <p:txBody>
+            <a:bodyPr wrap="none" rtlCol="0">
+              <a:spAutoFit/>
+            </a:bodyPr>
+            <a:lstStyle/>
+            <a:p>
+              <a:r>
+                <a:rPr lang="en-US" b="1" dirty="0">
+                  <a:solidFill>
+                    <a:schemeClr val="bg1"/>
+                  </a:solidFill>
+                  <a:effectLst>
+                    <a:outerShdw blurRad="38100" dist="38100" dir="2700000" algn="tl">
+                      <a:srgbClr val="000000">
+                        <a:alpha val="43137"/>
+                      </a:srgbClr>
+                    </a:outerShdw>
+                  </a:effectLst>
+                </a:rPr>
+                <a:t>protected</a:t>
+              </a:r>
+            </a:p>
+          </p:txBody>
+        </p:sp>
+      </p:grpSp>
+      <p:grpSp>
+        <p:nvGrpSpPr>
+          <p:cNvPr id="20" name="Group 19"/>
+          <p:cNvGrpSpPr/>
+          <p:nvPr/>
+        </p:nvGrpSpPr>
+        <p:grpSpPr>
+          <a:xfrm>
+            <a:off x="4949824" y="1878660"/>
+            <a:ext cx="2286000" cy="1600200"/>
+            <a:chOff x="3522633" y="3520336"/>
+            <a:chExt cx="2286000" cy="1600200"/>
+          </a:xfrm>
+        </p:grpSpPr>
+        <p:pic>
+          <p:nvPicPr>
+            <p:cNvPr id="21" name="Picture 4" descr="enter image description here"/>
+            <p:cNvPicPr>
+              <a:picLocks noChangeAspect="1" noChangeArrowheads="1"/>
+            </p:cNvPicPr>
+            <p:nvPr/>
+          </p:nvPicPr>
+          <p:blipFill rotWithShape="1">
+            <a:blip r:embed="rId3" cstate="print">
+              <a:extLst>
+                <a:ext uri="{28A0092B-C50C-407E-A947-70E740481C1C}">
+                  <a14:useLocalDpi xmlns:a14="http://schemas.microsoft.com/office/drawing/2010/main" val="0"/>
+                </a:ext>
+              </a:extLst>
+            </a:blip>
+            <a:srcRect l="13855" t="2871" r="13855" b="7289"/>
+            <a:stretch/>
+          </p:blipFill>
+          <p:spPr bwMode="auto">
+            <a:xfrm>
+              <a:off x="3522633" y="3520336"/>
+              <a:ext cx="2286000" cy="1600200"/>
+            </a:xfrm>
+            <a:prstGeom prst="rect">
+              <a:avLst/>
+            </a:prstGeom>
+            <a:noFill/>
+            <a:extLst>
+              <a:ext uri="{909E8E84-426E-40DD-AFC4-6F175D3DCCD1}">
+                <a14:hiddenFill xmlns:a14="http://schemas.microsoft.com/office/drawing/2010/main">
+                  <a:solidFill>
+                    <a:srgbClr val="FFFFFF"/>
+                  </a:solidFill>
+                </a14:hiddenFill>
+              </a:ext>
+            </a:extLst>
+          </p:spPr>
+        </p:pic>
+        <p:sp>
+          <p:nvSpPr>
+            <p:cNvPr id="22" name="TextBox 21"/>
+            <p:cNvSpPr txBox="1"/>
+            <p:nvPr/>
+          </p:nvSpPr>
+          <p:spPr>
+            <a:xfrm>
+              <a:off x="4034208" y="4643482"/>
+              <a:ext cx="1265090" cy="477054"/>
+            </a:xfrm>
+            <a:prstGeom prst="rect">
+              <a:avLst/>
+            </a:prstGeom>
+            <a:noFill/>
+          </p:spPr>
+          <p:txBody>
+            <a:bodyPr wrap="none" rtlCol="0">
+              <a:spAutoFit/>
+            </a:bodyPr>
+            <a:lstStyle/>
+            <a:p>
+              <a:r>
+                <a:rPr lang="en-US" b="1" dirty="0">
+                  <a:solidFill>
+                    <a:schemeClr val="bg1"/>
+                  </a:solidFill>
+                  <a:effectLst>
+                    <a:outerShdw blurRad="38100" dist="38100" dir="2700000" algn="tl">
+                      <a:srgbClr val="000000">
+                        <a:alpha val="43137"/>
+                      </a:srgbClr>
+                    </a:outerShdw>
+                  </a:effectLst>
+                </a:rPr>
+                <a:t>internal</a:t>
+              </a:r>
+            </a:p>
+          </p:txBody>
+        </p:sp>
+      </p:grpSp>
+      <p:grpSp>
+        <p:nvGrpSpPr>
+          <p:cNvPr id="23" name="Group 22"/>
+          <p:cNvGrpSpPr/>
+          <p:nvPr/>
+        </p:nvGrpSpPr>
+        <p:grpSpPr>
+          <a:xfrm>
+            <a:off x="7498137" y="3564948"/>
+            <a:ext cx="2514600" cy="1606725"/>
+            <a:chOff x="-93090" y="3556478"/>
+            <a:chExt cx="2514600" cy="1606725"/>
+          </a:xfrm>
+        </p:grpSpPr>
+        <p:pic>
+          <p:nvPicPr>
+            <p:cNvPr id="24" name="Picture 2" descr="enter image description here"/>
+            <p:cNvPicPr>
+              <a:picLocks noChangeAspect="1" noChangeArrowheads="1"/>
+            </p:cNvPicPr>
+            <p:nvPr/>
+          </p:nvPicPr>
+          <p:blipFill rotWithShape="1">
+            <a:blip r:embed="rId4" cstate="print">
+              <a:extLst>
+                <a:ext uri="{28A0092B-C50C-407E-A947-70E740481C1C}">
+                  <a14:useLocalDpi xmlns:a14="http://schemas.microsoft.com/office/drawing/2010/main" val="0"/>
+                </a:ext>
+              </a:extLst>
+            </a:blip>
+            <a:srcRect l="9176" t="2871" r="11306" b="7290"/>
+            <a:stretch/>
+          </p:blipFill>
+          <p:spPr bwMode="auto">
+            <a:xfrm>
+              <a:off x="-93090" y="3556478"/>
+              <a:ext cx="2514600" cy="1600201"/>
+            </a:xfrm>
+            <a:prstGeom prst="rect">
+              <a:avLst/>
+            </a:prstGeom>
+            <a:noFill/>
+            <a:extLst>
+              <a:ext uri="{909E8E84-426E-40DD-AFC4-6F175D3DCCD1}">
+                <a14:hiddenFill xmlns:a14="http://schemas.microsoft.com/office/drawing/2010/main">
+                  <a:solidFill>
+                    <a:srgbClr val="FFFFFF"/>
+                  </a:solidFill>
+                </a14:hiddenFill>
+              </a:ext>
+            </a:extLst>
+          </p:spPr>
+        </p:pic>
+        <p:sp>
+          <p:nvSpPr>
+            <p:cNvPr id="25" name="TextBox 24"/>
+            <p:cNvSpPr txBox="1"/>
+            <p:nvPr/>
+          </p:nvSpPr>
+          <p:spPr>
+            <a:xfrm>
+              <a:off x="-6640" y="4686149"/>
+              <a:ext cx="2428150" cy="477054"/>
+            </a:xfrm>
+            <a:prstGeom prst="rect">
+              <a:avLst/>
+            </a:prstGeom>
+            <a:noFill/>
+          </p:spPr>
+          <p:txBody>
+            <a:bodyPr wrap="square" rtlCol="0">
+              <a:spAutoFit/>
+            </a:bodyPr>
+            <a:lstStyle/>
+            <a:p>
+              <a:r>
+                <a:rPr lang="en-US" b="1" u="sng" dirty="0">
+                  <a:solidFill>
+                    <a:schemeClr val="bg1"/>
+                  </a:solidFill>
+                  <a:effectLst>
+                    <a:outerShdw blurRad="38100" dist="38100" dir="2700000" algn="tl">
+                      <a:srgbClr val="000000">
+                        <a:alpha val="43137"/>
+                      </a:srgbClr>
+                    </a:outerShdw>
+                  </a:effectLst>
+                </a:rPr>
+                <a:t>private</a:t>
+              </a:r>
+              <a:r>
+                <a:rPr lang="en-US" b="1" u="sng" dirty="0"/>
+                <a:t> </a:t>
+              </a:r>
+              <a:r>
+                <a:rPr lang="en-US" b="1" u="sng" dirty="0">
+                  <a:solidFill>
+                    <a:schemeClr val="bg1"/>
+                  </a:solidFill>
+                  <a:effectLst>
+                    <a:outerShdw blurRad="38100" dist="38100" dir="2700000" algn="tl">
+                      <a:srgbClr val="000000">
+                        <a:alpha val="43137"/>
+                      </a:srgbClr>
+                    </a:outerShdw>
+                  </a:effectLst>
+                </a:rPr>
+                <a:t>protected</a:t>
+              </a:r>
+            </a:p>
+          </p:txBody>
+        </p:sp>
+      </p:grpSp>
+      <p:grpSp>
+        <p:nvGrpSpPr>
+          <p:cNvPr id="26" name="Group 25"/>
+          <p:cNvGrpSpPr/>
+          <p:nvPr/>
+        </p:nvGrpSpPr>
+        <p:grpSpPr>
+          <a:xfrm>
+            <a:off x="4746942" y="3581400"/>
+            <a:ext cx="2691763" cy="1600200"/>
+            <a:chOff x="571188" y="4876800"/>
+            <a:chExt cx="2691763" cy="1600200"/>
+          </a:xfrm>
+        </p:grpSpPr>
+        <p:pic>
+          <p:nvPicPr>
+            <p:cNvPr id="27" name="Picture 8" descr="enter image description here"/>
+            <p:cNvPicPr>
+              <a:picLocks noChangeAspect="1" noChangeArrowheads="1"/>
+            </p:cNvPicPr>
+            <p:nvPr/>
+          </p:nvPicPr>
+          <p:blipFill rotWithShape="1">
+            <a:blip r:embed="rId5" cstate="print">
+              <a:extLst>
+                <a:ext uri="{28A0092B-C50C-407E-A947-70E740481C1C}">
+                  <a14:useLocalDpi xmlns:a14="http://schemas.microsoft.com/office/drawing/2010/main" val="0"/>
+                </a:ext>
+              </a:extLst>
+            </a:blip>
+            <a:srcRect l="8485" t="5882" r="11998" b="4279"/>
+            <a:stretch/>
+          </p:blipFill>
+          <p:spPr bwMode="auto">
+            <a:xfrm>
+              <a:off x="659770" y="4876800"/>
+              <a:ext cx="2514600" cy="1600200"/>
+            </a:xfrm>
+            <a:prstGeom prst="rect">
+              <a:avLst/>
+            </a:prstGeom>
+            <a:noFill/>
+            <a:extLst>
+              <a:ext uri="{909E8E84-426E-40DD-AFC4-6F175D3DCCD1}">
+                <a14:hiddenFill xmlns:a14="http://schemas.microsoft.com/office/drawing/2010/main">
+                  <a:solidFill>
+                    <a:srgbClr val="FFFFFF"/>
+                  </a:solidFill>
+                </a14:hiddenFill>
+              </a:ext>
+            </a:extLst>
+          </p:spPr>
+        </p:pic>
+        <p:sp>
+          <p:nvSpPr>
+            <p:cNvPr id="28" name="TextBox 27"/>
+            <p:cNvSpPr txBox="1"/>
+            <p:nvPr/>
+          </p:nvSpPr>
+          <p:spPr>
+            <a:xfrm>
+              <a:off x="571188" y="5999946"/>
+              <a:ext cx="2691763" cy="477054"/>
+            </a:xfrm>
+            <a:prstGeom prst="rect">
+              <a:avLst/>
+            </a:prstGeom>
+            <a:noFill/>
+          </p:spPr>
+          <p:txBody>
+            <a:bodyPr wrap="none" rtlCol="0">
+              <a:spAutoFit/>
+            </a:bodyPr>
+            <a:lstStyle/>
+            <a:p>
+              <a:r>
+                <a:rPr lang="en-US" b="1" dirty="0">
+                  <a:solidFill>
+                    <a:schemeClr val="bg1"/>
+                  </a:solidFill>
+                  <a:effectLst>
+                    <a:outerShdw blurRad="38100" dist="38100" dir="2700000" algn="tl">
+                      <a:srgbClr val="000000">
+                        <a:alpha val="43137"/>
+                      </a:srgbClr>
+                    </a:outerShdw>
+                  </a:effectLst>
+                </a:rPr>
+                <a:t>protected internal</a:t>
+              </a:r>
+            </a:p>
+          </p:txBody>
+        </p:sp>
+      </p:grpSp>
+      <p:grpSp>
+        <p:nvGrpSpPr>
+          <p:cNvPr id="29" name="Group 28"/>
+          <p:cNvGrpSpPr/>
+          <p:nvPr/>
+        </p:nvGrpSpPr>
+        <p:grpSpPr>
+          <a:xfrm>
+            <a:off x="7612437" y="1878660"/>
+            <a:ext cx="2286000" cy="1600200"/>
+            <a:chOff x="3522633" y="4876800"/>
+            <a:chExt cx="2286000" cy="1600200"/>
+          </a:xfrm>
+        </p:grpSpPr>
+        <p:pic>
+          <p:nvPicPr>
+            <p:cNvPr id="30" name="Picture 10" descr="enter image description here"/>
+            <p:cNvPicPr>
+              <a:picLocks noChangeAspect="1" noChangeArrowheads="1"/>
+            </p:cNvPicPr>
+            <p:nvPr/>
+          </p:nvPicPr>
+          <p:blipFill rotWithShape="1">
+            <a:blip r:embed="rId6" cstate="print">
+              <a:extLst>
+                <a:ext uri="{28A0092B-C50C-407E-A947-70E740481C1C}">
+                  <a14:useLocalDpi xmlns:a14="http://schemas.microsoft.com/office/drawing/2010/main" val="0"/>
+                </a:ext>
+              </a:extLst>
+            </a:blip>
+            <a:srcRect l="13303" t="4278" r="14408" b="5882"/>
+            <a:stretch/>
+          </p:blipFill>
+          <p:spPr bwMode="auto">
+            <a:xfrm>
+              <a:off x="3522633" y="4876800"/>
+              <a:ext cx="2286000" cy="1600200"/>
+            </a:xfrm>
+            <a:prstGeom prst="rect">
+              <a:avLst/>
+            </a:prstGeom>
+            <a:noFill/>
+            <a:extLst>
+              <a:ext uri="{909E8E84-426E-40DD-AFC4-6F175D3DCCD1}">
+                <a14:hiddenFill xmlns:a14="http://schemas.microsoft.com/office/drawing/2010/main">
+                  <a:solidFill>
+                    <a:srgbClr val="FFFFFF"/>
+                  </a:solidFill>
+                </a14:hiddenFill>
+              </a:ext>
+            </a:extLst>
+          </p:spPr>
+        </p:pic>
+        <p:sp>
+          <p:nvSpPr>
+            <p:cNvPr id="31" name="TextBox 30"/>
+            <p:cNvSpPr txBox="1"/>
+            <p:nvPr/>
+          </p:nvSpPr>
+          <p:spPr>
+            <a:xfrm>
+              <a:off x="4084384" y="5999946"/>
+              <a:ext cx="1162498" cy="477054"/>
+            </a:xfrm>
+            <a:prstGeom prst="rect">
+              <a:avLst/>
+            </a:prstGeom>
+            <a:noFill/>
+          </p:spPr>
+          <p:txBody>
+            <a:bodyPr wrap="none" rtlCol="0">
+              <a:spAutoFit/>
+            </a:bodyPr>
+            <a:lstStyle/>
+            <a:p>
+              <a:r>
+                <a:rPr lang="en-US" b="1" dirty="0">
+                  <a:solidFill>
+                    <a:schemeClr val="bg1"/>
+                  </a:solidFill>
+                  <a:effectLst>
+                    <a:outerShdw blurRad="38100" dist="38100" dir="2700000" algn="tl">
+                      <a:srgbClr val="000000">
+                        <a:alpha val="43137"/>
+                      </a:srgbClr>
+                    </a:outerShdw>
+                  </a:effectLst>
+                </a:rPr>
+                <a:t>private</a:t>
+              </a:r>
+            </a:p>
+          </p:txBody>
+        </p:sp>
+      </p:grpSp>
+      <p:grpSp>
+        <p:nvGrpSpPr>
+          <p:cNvPr id="32" name="Group 31"/>
+          <p:cNvGrpSpPr/>
+          <p:nvPr/>
+        </p:nvGrpSpPr>
+        <p:grpSpPr>
+          <a:xfrm>
+            <a:off x="2211011" y="1878660"/>
+            <a:ext cx="2362200" cy="1600200"/>
+            <a:chOff x="6128321" y="4876800"/>
+            <a:chExt cx="2362200" cy="1600200"/>
+          </a:xfrm>
+        </p:grpSpPr>
+        <p:pic>
+          <p:nvPicPr>
+            <p:cNvPr id="33" name="Picture 12" descr="enter image description here"/>
+            <p:cNvPicPr>
+              <a:picLocks noChangeAspect="1" noChangeArrowheads="1"/>
+            </p:cNvPicPr>
+            <p:nvPr/>
+          </p:nvPicPr>
+          <p:blipFill rotWithShape="1">
+            <a:blip r:embed="rId7" cstate="print">
+              <a:extLst>
+                <a:ext uri="{28A0092B-C50C-407E-A947-70E740481C1C}">
+                  <a14:useLocalDpi xmlns:a14="http://schemas.microsoft.com/office/drawing/2010/main" val="0"/>
+                </a:ext>
+              </a:extLst>
+            </a:blip>
+            <a:srcRect l="12048" t="4278" r="13253" b="5882"/>
+            <a:stretch/>
+          </p:blipFill>
+          <p:spPr bwMode="auto">
+            <a:xfrm>
+              <a:off x="6128321" y="4876800"/>
+              <a:ext cx="2362200" cy="1600200"/>
+            </a:xfrm>
+            <a:prstGeom prst="rect">
+              <a:avLst/>
+            </a:prstGeom>
+            <a:noFill/>
+            <a:extLst>
+              <a:ext uri="{909E8E84-426E-40DD-AFC4-6F175D3DCCD1}">
+                <a14:hiddenFill xmlns:a14="http://schemas.microsoft.com/office/drawing/2010/main">
+                  <a:solidFill>
+                    <a:srgbClr val="FFFFFF"/>
+                  </a:solidFill>
+                </a14:hiddenFill>
+              </a:ext>
+            </a:extLst>
+          </p:spPr>
+        </p:pic>
+        <p:sp>
+          <p:nvSpPr>
+            <p:cNvPr id="34" name="TextBox 33"/>
+            <p:cNvSpPr txBox="1"/>
+            <p:nvPr/>
+          </p:nvSpPr>
+          <p:spPr>
+            <a:xfrm>
+              <a:off x="6795618" y="5999946"/>
+              <a:ext cx="1015021" cy="477054"/>
+            </a:xfrm>
+            <a:prstGeom prst="rect">
+              <a:avLst/>
+            </a:prstGeom>
+            <a:noFill/>
+          </p:spPr>
+          <p:txBody>
+            <a:bodyPr wrap="none" rtlCol="0">
+              <a:spAutoFit/>
+            </a:bodyPr>
+            <a:lstStyle/>
+            <a:p>
+              <a:r>
+                <a:rPr lang="en-US" b="1" dirty="0">
+                  <a:solidFill>
+                    <a:schemeClr val="bg1"/>
+                  </a:solidFill>
+                  <a:effectLst>
+                    <a:outerShdw blurRad="38100" dist="38100" dir="2700000" algn="tl">
+                      <a:srgbClr val="000000">
+                        <a:alpha val="43137"/>
+                      </a:srgbClr>
+                    </a:outerShdw>
+                  </a:effectLst>
+                </a:rPr>
+                <a:t>public</a:t>
+              </a:r>
+            </a:p>
+          </p:txBody>
+        </p:sp>
+      </p:grpSp>
+      <p:sp>
+        <p:nvSpPr>
+          <p:cNvPr id="35" name="Rectangle 34"/>
+          <p:cNvSpPr>
+            <a:spLocks noChangeArrowheads="1"/>
+          </p:cNvSpPr>
+          <p:nvPr/>
+        </p:nvSpPr>
+        <p:spPr bwMode="auto">
+          <a:xfrm>
+            <a:off x="1235222" y="6019800"/>
+            <a:ext cx="9718380" cy="400110"/>
+          </a:xfrm>
+          <a:prstGeom prst="rect">
+            <a:avLst/>
+          </a:prstGeom>
+          <a:solidFill>
+            <a:schemeClr val="accent5">
+              <a:lumMod val="40000"/>
+              <a:lumOff val="60000"/>
+              <a:alpha val="15000"/>
+            </a:schemeClr>
+          </a:solidFill>
+          <a:ln w="12700">
+            <a:solidFill>
+              <a:schemeClr val="accent5">
+                <a:lumMod val="60000"/>
+                <a:lumOff val="40000"/>
+              </a:schemeClr>
+            </a:solidFill>
+          </a:ln>
+        </p:spPr>
+        <p:txBody>
+          <a:bodyPr wrap="square">
+            <a:spAutoFit/>
+          </a:bodyPr>
+          <a:lstStyle/>
+          <a:p>
+            <a:r>
+              <a:rPr lang="en-US" sz="2000" b="1" noProof="1">
+                <a:solidFill>
+                  <a:srgbClr val="8CF4F2"/>
+                </a:solidFill>
+                <a:effectLst>
+                  <a:outerShdw blurRad="38100" dist="38100" dir="2700000" algn="tl">
+                    <a:srgbClr val="000000">
+                      <a:alpha val="43137"/>
+                    </a:srgbClr>
+                  </a:outerShdw>
+                </a:effectLst>
+                <a:latin typeface="Consolas" pitchFamily="49" charset="0"/>
+              </a:rPr>
+              <a:t>dbData</a:t>
+            </a:r>
+            <a:r>
+              <a:rPr lang="bg-BG" sz="2000" b="1" noProof="1">
+                <a:solidFill>
+                  <a:srgbClr val="8CF4F2"/>
+                </a:solidFill>
+                <a:effectLst>
+                  <a:outerShdw blurRad="38100" dist="38100" dir="2700000" algn="tl">
+                    <a:srgbClr val="000000">
+                      <a:alpha val="43137"/>
+                    </a:srgbClr>
+                  </a:outerShdw>
+                </a:effectLst>
+                <a:latin typeface="Consolas" pitchFamily="49" charset="0"/>
+              </a:rPr>
+              <a:t>.</a:t>
+            </a:r>
+            <a:r>
+              <a:rPr lang="fr-FR" sz="2000" b="1" noProof="1">
+                <a:solidFill>
+                  <a:srgbClr val="8CF4F2"/>
+                </a:solidFill>
+                <a:effectLst>
+                  <a:outerShdw blurRad="38100" dist="38100" dir="2700000" algn="tl">
+                    <a:srgbClr val="000000">
+                      <a:alpha val="43137"/>
+                    </a:srgbClr>
+                  </a:outerShdw>
+                </a:effectLst>
+                <a:latin typeface="Consolas" pitchFamily="49" charset="0"/>
+              </a:rPr>
+              <a:t>OrderBy(_ =&gt; Guid.NewGuid())</a:t>
+            </a:r>
+            <a:endParaRPr lang="en-US" sz="2000" b="1" noProof="1">
+              <a:solidFill>
+                <a:srgbClr val="8CF4F2"/>
+              </a:solidFill>
+              <a:effectLst>
+                <a:outerShdw blurRad="38100" dist="38100" dir="2700000" algn="tl">
+                  <a:srgbClr val="000000">
+                    <a:alpha val="43137"/>
+                  </a:srgbClr>
+                </a:outerShdw>
+              </a:effectLst>
+              <a:latin typeface="Consolas" pitchFamily="49" charset="0"/>
+            </a:endParaRPr>
+          </a:p>
+        </p:txBody>
+      </p:sp>
+    </p:spTree>
+    <p:extLst>
+      <p:ext uri="{BB962C8B-B14F-4D97-AF65-F5344CB8AC3E}">
+        <p14:creationId xmlns:p14="http://schemas.microsoft.com/office/powerpoint/2010/main" val="2241104050"/>
+      </p:ext>
+    </p:extLst>
+  </p:cSld>
+  <p:clrMapOvr>
+    <a:masterClrMapping/>
+  </p:clrMapOvr>
+</p:sld>
+</file>
+
+<file path=ppt/slides/slide53.xml><?xml version="1.0" encoding="utf-8"?>
+<p:sld xmlns:a="http://schemas.openxmlformats.org/drawingml/2006/main" xmlns:r="http://schemas.openxmlformats.org/officeDocument/2006/relationships" xmlns:p="http://schemas.openxmlformats.org/presentationml/2006/main">
+  <p:cSld>
+    <p:spTree>
+      <p:nvGrpSpPr>
+        <p:cNvPr id="1" name=""/>
+        <p:cNvGrpSpPr/>
+        <p:nvPr/>
+      </p:nvGrpSpPr>
+      <p:grpSpPr>
+        <a:xfrm>
+          <a:off x="0" y="0"/>
+          <a:ext cx="0" cy="0"/>
+          <a:chOff x="0" y="0"/>
+          <a:chExt cx="0" cy="0"/>
+        </a:xfrm>
+      </p:grpSpPr>
+      <p:sp>
+        <p:nvSpPr>
+          <p:cNvPr id="2" name="Slide Number Placeholder 1"/>
+          <p:cNvSpPr>
+            <a:spLocks noGrp="1"/>
+          </p:cNvSpPr>
+          <p:nvPr>
+            <p:ph type="sldNum" sz="quarter" idx="4"/>
+          </p:nvPr>
+        </p:nvSpPr>
+        <p:spPr/>
+        <p:txBody>
+          <a:bodyPr/>
+          <a:lstStyle/>
+          <a:p>
+            <a:fld id="{C014DD1E-5D91-48A3-AD6D-45FBA980D106}" type="slidenum">
+              <a:rPr lang="en-US" smtClean="0"/>
+              <a:pPr/>
+              <a:t>53</a:t>
+            </a:fld>
+            <a:endParaRPr lang="en-US" dirty="0"/>
+          </a:p>
+        </p:txBody>
+      </p:sp>
+      <p:sp>
+        <p:nvSpPr>
+          <p:cNvPr id="3" name="Content Placeholder 2"/>
+          <p:cNvSpPr>
+            <a:spLocks noGrp="1"/>
+          </p:cNvSpPr>
+          <p:nvPr>
+            <p:ph idx="1"/>
+          </p:nvPr>
+        </p:nvSpPr>
+        <p:spPr>
+          <a:xfrm>
+            <a:off x="190413" y="990600"/>
+            <a:ext cx="11804822" cy="5570355"/>
+          </a:xfrm>
+        </p:spPr>
+        <p:txBody>
+          <a:bodyPr/>
+          <a:lstStyle/>
+          <a:p>
+            <a:r>
+              <a:rPr lang="en-US" dirty="0"/>
+              <a:t>Mix Declarations and Variables in Deconstruction</a:t>
+            </a:r>
+          </a:p>
+          <a:p>
+            <a:endParaRPr lang="en-US" dirty="0"/>
+          </a:p>
+          <a:p>
+            <a:r>
+              <a:rPr lang="en-US" dirty="0"/>
+              <a:t>Pattern-matching with generics</a:t>
+            </a:r>
+          </a:p>
+          <a:p>
+            <a:endParaRPr lang="en-US" dirty="0"/>
+          </a:p>
+          <a:p>
+            <a:r>
+              <a:rPr lang="en-US" dirty="0"/>
+              <a:t>Expression variables in initializers</a:t>
+            </a:r>
+          </a:p>
+          <a:p>
+            <a:endParaRPr lang="en-US" dirty="0"/>
+          </a:p>
+          <a:p>
+            <a:r>
+              <a:rPr lang="en-US" dirty="0"/>
+              <a:t>Auto-Implemented Property Field-Targeted Attributes</a:t>
+            </a:r>
+          </a:p>
+        </p:txBody>
+      </p:sp>
+      <p:sp>
+        <p:nvSpPr>
+          <p:cNvPr id="4" name="Title 3"/>
+          <p:cNvSpPr>
+            <a:spLocks noGrp="1"/>
+          </p:cNvSpPr>
+          <p:nvPr>
+            <p:ph type="title"/>
+          </p:nvPr>
+        </p:nvSpPr>
+        <p:spPr/>
+        <p:txBody>
+          <a:bodyPr/>
+          <a:lstStyle/>
+          <a:p>
+            <a:r>
+              <a:rPr lang="en-US" dirty="0"/>
+              <a:t>Plans for C# 7.1 (</a:t>
+            </a:r>
+            <a:r>
+              <a:rPr lang="bg-BG" dirty="0"/>
+              <a:t>3</a:t>
+            </a:r>
+            <a:r>
+              <a:rPr lang="en-US" dirty="0"/>
+              <a:t>)</a:t>
+            </a:r>
+          </a:p>
+        </p:txBody>
+      </p:sp>
+      <p:sp>
+        <p:nvSpPr>
+          <p:cNvPr id="5" name="Rectangle 4"/>
+          <p:cNvSpPr>
+            <a:spLocks noChangeArrowheads="1"/>
+          </p:cNvSpPr>
+          <p:nvPr/>
+        </p:nvSpPr>
+        <p:spPr bwMode="auto">
+          <a:xfrm>
+            <a:off x="1233634" y="1592079"/>
+            <a:ext cx="9718380" cy="707886"/>
+          </a:xfrm>
+          <a:prstGeom prst="rect">
+            <a:avLst/>
+          </a:prstGeom>
+          <a:solidFill>
+            <a:schemeClr val="accent5">
+              <a:lumMod val="40000"/>
+              <a:lumOff val="60000"/>
+              <a:alpha val="15000"/>
+            </a:schemeClr>
+          </a:solidFill>
+          <a:ln w="12700">
+            <a:solidFill>
+              <a:schemeClr val="accent5">
+                <a:lumMod val="60000"/>
+                <a:lumOff val="40000"/>
+              </a:schemeClr>
+            </a:solidFill>
+          </a:ln>
+        </p:spPr>
+        <p:txBody>
+          <a:bodyPr wrap="square">
+            <a:spAutoFit/>
+          </a:bodyPr>
+          <a:lstStyle/>
+          <a:p>
+            <a:r>
+              <a:rPr lang="en-US" sz="2000" b="1" noProof="1">
+                <a:solidFill>
+                  <a:srgbClr val="8CF4F2"/>
+                </a:solidFill>
+                <a:effectLst>
+                  <a:outerShdw blurRad="38100" dist="38100" dir="2700000" algn="tl">
+                    <a:srgbClr val="000000">
+                      <a:alpha val="43137"/>
+                    </a:srgbClr>
+                  </a:outerShdw>
+                </a:effectLst>
+                <a:latin typeface="Consolas" pitchFamily="49" charset="0"/>
+              </a:rPr>
+              <a:t>int x = 0; // Existing variable</a:t>
+            </a:r>
+          </a:p>
+          <a:p>
+            <a:r>
+              <a:rPr lang="en-US" sz="2000" b="1" noProof="1">
+                <a:solidFill>
+                  <a:schemeClr val="accent4">
+                    <a:lumMod val="75000"/>
+                  </a:schemeClr>
+                </a:solidFill>
+                <a:effectLst>
+                  <a:outerShdw blurRad="38100" dist="38100" dir="2700000" algn="tl">
+                    <a:srgbClr val="000000">
+                      <a:alpha val="43137"/>
+                    </a:srgbClr>
+                  </a:outerShdw>
+                </a:effectLst>
+                <a:latin typeface="Consolas" pitchFamily="49" charset="0"/>
+              </a:rPr>
+              <a:t>(x, var y) = e</a:t>
+            </a:r>
+            <a:r>
+              <a:rPr lang="en-US" sz="2000" b="1" noProof="1">
+                <a:solidFill>
+                  <a:srgbClr val="8CF4F2"/>
+                </a:solidFill>
+                <a:effectLst>
+                  <a:outerShdw blurRad="38100" dist="38100" dir="2700000" algn="tl">
+                    <a:srgbClr val="000000">
+                      <a:alpha val="43137"/>
+                    </a:srgbClr>
+                  </a:outerShdw>
+                </a:effectLst>
+                <a:latin typeface="Consolas" pitchFamily="49" charset="0"/>
+              </a:rPr>
+              <a:t>; // x should be assigned and y declared and assigned</a:t>
+            </a:r>
+          </a:p>
+        </p:txBody>
+      </p:sp>
+      <p:sp>
+        <p:nvSpPr>
+          <p:cNvPr id="7" name="Rectangle 6"/>
+          <p:cNvSpPr>
+            <a:spLocks noChangeArrowheads="1"/>
+          </p:cNvSpPr>
+          <p:nvPr/>
+        </p:nvSpPr>
+        <p:spPr bwMode="auto">
+          <a:xfrm>
+            <a:off x="1233634" y="3175612"/>
+            <a:ext cx="9718380" cy="400110"/>
+          </a:xfrm>
+          <a:prstGeom prst="rect">
+            <a:avLst/>
+          </a:prstGeom>
+          <a:solidFill>
+            <a:schemeClr val="accent5">
+              <a:lumMod val="40000"/>
+              <a:lumOff val="60000"/>
+              <a:alpha val="15000"/>
+            </a:schemeClr>
+          </a:solidFill>
+          <a:ln w="12700">
+            <a:solidFill>
+              <a:schemeClr val="accent5">
+                <a:lumMod val="60000"/>
+                <a:lumOff val="40000"/>
+              </a:schemeClr>
+            </a:solidFill>
+          </a:ln>
+        </p:spPr>
+        <p:txBody>
+          <a:bodyPr wrap="square">
+            <a:spAutoFit/>
+          </a:bodyPr>
+          <a:lstStyle/>
+          <a:p>
+            <a:r>
+              <a:rPr lang="en-US" sz="2000" b="1" noProof="1">
+                <a:solidFill>
+                  <a:srgbClr val="8CF4F2"/>
+                </a:solidFill>
+                <a:effectLst>
+                  <a:outerShdw blurRad="38100" dist="38100" dir="2700000" algn="tl">
+                    <a:srgbClr val="000000">
+                      <a:alpha val="43137"/>
+                    </a:srgbClr>
+                  </a:outerShdw>
+                </a:effectLst>
+                <a:latin typeface="Consolas" pitchFamily="49" charset="0"/>
+              </a:rPr>
+              <a:t>static void M&lt;T&gt;(T o) { if (</a:t>
+            </a:r>
+            <a:r>
+              <a:rPr lang="en-US" sz="2000" b="1" noProof="1">
+                <a:solidFill>
+                  <a:schemeClr val="accent4">
+                    <a:lumMod val="75000"/>
+                  </a:schemeClr>
+                </a:solidFill>
+                <a:effectLst>
+                  <a:outerShdw blurRad="38100" dist="38100" dir="2700000" algn="tl">
+                    <a:srgbClr val="000000">
+                      <a:alpha val="43137"/>
+                    </a:srgbClr>
+                  </a:outerShdw>
+                </a:effectLst>
+                <a:latin typeface="Consolas" pitchFamily="49" charset="0"/>
+              </a:rPr>
+              <a:t>o is ComplexType x</a:t>
+            </a:r>
+            <a:r>
+              <a:rPr lang="en-US" sz="2000" b="1" noProof="1">
+                <a:solidFill>
+                  <a:srgbClr val="8CF4F2"/>
+                </a:solidFill>
+                <a:effectLst>
+                  <a:outerShdw blurRad="38100" dist="38100" dir="2700000" algn="tl">
+                    <a:srgbClr val="000000">
+                      <a:alpha val="43137"/>
+                    </a:srgbClr>
+                  </a:outerShdw>
+                </a:effectLst>
+                <a:latin typeface="Consolas" pitchFamily="49" charset="0"/>
+              </a:rPr>
+              <a:t>) {  } }</a:t>
+            </a:r>
+          </a:p>
+        </p:txBody>
+      </p:sp>
+      <p:sp>
+        <p:nvSpPr>
+          <p:cNvPr id="9" name="Rectangle 8"/>
+          <p:cNvSpPr>
+            <a:spLocks noChangeArrowheads="1"/>
+          </p:cNvSpPr>
+          <p:nvPr/>
+        </p:nvSpPr>
+        <p:spPr bwMode="auto">
+          <a:xfrm>
+            <a:off x="1233634" y="4421439"/>
+            <a:ext cx="9718380" cy="707886"/>
+          </a:xfrm>
+          <a:prstGeom prst="rect">
+            <a:avLst/>
+          </a:prstGeom>
+          <a:solidFill>
+            <a:schemeClr val="accent5">
+              <a:lumMod val="40000"/>
+              <a:lumOff val="60000"/>
+              <a:alpha val="15000"/>
+            </a:schemeClr>
+          </a:solidFill>
+          <a:ln w="12700">
+            <a:solidFill>
+              <a:schemeClr val="accent5">
+                <a:lumMod val="60000"/>
+                <a:lumOff val="40000"/>
+              </a:schemeClr>
+            </a:solidFill>
+          </a:ln>
+        </p:spPr>
+        <p:txBody>
+          <a:bodyPr wrap="square">
+            <a:spAutoFit/>
+          </a:bodyPr>
+          <a:lstStyle/>
+          <a:p>
+            <a:r>
+              <a:rPr lang="en-US" sz="2000" b="1" noProof="1">
+                <a:solidFill>
+                  <a:srgbClr val="8CF4F2"/>
+                </a:solidFill>
+                <a:effectLst>
+                  <a:outerShdw blurRad="38100" dist="38100" dir="2700000" algn="tl">
+                    <a:srgbClr val="000000">
+                      <a:alpha val="43137"/>
+                    </a:srgbClr>
+                  </a:outerShdw>
+                </a:effectLst>
+                <a:latin typeface="Consolas" pitchFamily="49" charset="0"/>
+              </a:rPr>
+              <a:t>static int SisZero =&gt; int.TryParse(s, </a:t>
+            </a:r>
+            <a:r>
+              <a:rPr lang="en-US" sz="2000" b="1" noProof="1">
+                <a:solidFill>
+                  <a:schemeClr val="accent4">
+                    <a:lumMod val="75000"/>
+                  </a:schemeClr>
+                </a:solidFill>
+                <a:effectLst>
+                  <a:outerShdw blurRad="38100" dist="38100" dir="2700000" algn="tl">
+                    <a:srgbClr val="000000">
+                      <a:alpha val="43137"/>
+                    </a:srgbClr>
+                  </a:outerShdw>
+                </a:effectLst>
+                <a:latin typeface="Consolas" pitchFamily="49" charset="0"/>
+              </a:rPr>
+              <a:t>out int </a:t>
+            </a:r>
+            <a:r>
+              <a:rPr lang="en-US" sz="2000" b="1" noProof="1">
+                <a:solidFill>
+                  <a:srgbClr val="8CF4F2"/>
+                </a:solidFill>
+                <a:effectLst>
+                  <a:outerShdw blurRad="38100" dist="38100" dir="2700000" algn="tl">
+                    <a:srgbClr val="000000">
+                      <a:alpha val="43137"/>
+                    </a:srgbClr>
+                  </a:outerShdw>
+                </a:effectLst>
+                <a:latin typeface="Consolas" pitchFamily="49" charset="0"/>
+              </a:rPr>
+              <a:t>i) ? i==0 : false;</a:t>
+            </a:r>
+          </a:p>
+          <a:p>
+            <a:r>
+              <a:rPr lang="en-US" sz="2000" b="1" noProof="1">
+                <a:solidFill>
+                  <a:srgbClr val="8CF4F2"/>
+                </a:solidFill>
+                <a:effectLst>
+                  <a:outerShdw blurRad="38100" dist="38100" dir="2700000" algn="tl">
+                    <a:srgbClr val="000000">
+                      <a:alpha val="43137"/>
+                    </a:srgbClr>
+                  </a:outerShdw>
+                </a:effectLst>
+                <a:latin typeface="Consolas" pitchFamily="49" charset="0"/>
+              </a:rPr>
+              <a:t>public C(string s) : base(int.TryParse(s, </a:t>
+            </a:r>
+            <a:r>
+              <a:rPr lang="en-US" sz="2000" b="1" noProof="1">
+                <a:solidFill>
+                  <a:schemeClr val="accent4">
+                    <a:lumMod val="75000"/>
+                  </a:schemeClr>
+                </a:solidFill>
+                <a:effectLst>
+                  <a:outerShdw blurRad="38100" dist="38100" dir="2700000" algn="tl">
+                    <a:srgbClr val="000000">
+                      <a:alpha val="43137"/>
+                    </a:srgbClr>
+                  </a:outerShdw>
+                </a:effectLst>
+                <a:latin typeface="Consolas" pitchFamily="49" charset="0"/>
+              </a:rPr>
+              <a:t>out int </a:t>
+            </a:r>
+            <a:r>
+              <a:rPr lang="en-US" sz="2000" b="1" noProof="1">
+                <a:solidFill>
+                  <a:srgbClr val="8CF4F2"/>
+                </a:solidFill>
+                <a:effectLst>
+                  <a:outerShdw blurRad="38100" dist="38100" dir="2700000" algn="tl">
+                    <a:srgbClr val="000000">
+                      <a:alpha val="43137"/>
+                    </a:srgbClr>
+                  </a:outerShdw>
+                </a:effectLst>
+                <a:latin typeface="Consolas" pitchFamily="49" charset="0"/>
+              </a:rPr>
+              <a:t>i) ? i==0 : false)</a:t>
+            </a:r>
+          </a:p>
+        </p:txBody>
+      </p:sp>
+      <p:sp>
+        <p:nvSpPr>
+          <p:cNvPr id="12" name="Rectangle 11"/>
+          <p:cNvSpPr>
+            <a:spLocks noChangeArrowheads="1"/>
+          </p:cNvSpPr>
+          <p:nvPr/>
+        </p:nvSpPr>
+        <p:spPr bwMode="auto">
+          <a:xfrm>
+            <a:off x="1233634" y="5822399"/>
+            <a:ext cx="9718380" cy="707886"/>
+          </a:xfrm>
+          <a:prstGeom prst="rect">
+            <a:avLst/>
+          </a:prstGeom>
+          <a:solidFill>
+            <a:schemeClr val="accent5">
+              <a:lumMod val="40000"/>
+              <a:lumOff val="60000"/>
+              <a:alpha val="15000"/>
+            </a:schemeClr>
+          </a:solidFill>
+          <a:ln w="12700">
+            <a:solidFill>
+              <a:schemeClr val="accent5">
+                <a:lumMod val="60000"/>
+                <a:lumOff val="40000"/>
+              </a:schemeClr>
+            </a:solidFill>
+          </a:ln>
+        </p:spPr>
+        <p:txBody>
+          <a:bodyPr wrap="square">
+            <a:spAutoFit/>
+          </a:bodyPr>
+          <a:lstStyle/>
+          <a:p>
+            <a:r>
+              <a:rPr lang="en-US" sz="2000" b="1" noProof="1">
+                <a:solidFill>
+                  <a:schemeClr val="accent4">
+                    <a:lumMod val="75000"/>
+                  </a:schemeClr>
+                </a:solidFill>
+                <a:effectLst>
+                  <a:outerShdw blurRad="38100" dist="38100" dir="2700000" algn="tl">
+                    <a:srgbClr val="000000">
+                      <a:alpha val="43137"/>
+                    </a:srgbClr>
+                  </a:outerShdw>
+                </a:effectLst>
+                <a:latin typeface="Consolas" pitchFamily="49" charset="0"/>
+              </a:rPr>
+              <a:t>[field: NonSerialized] </a:t>
+            </a:r>
+            <a:r>
+              <a:rPr lang="en-US" sz="2000" b="1" noProof="1">
+                <a:solidFill>
+                  <a:srgbClr val="8CF4F2"/>
+                </a:solidFill>
+                <a:effectLst>
+                  <a:outerShdw blurRad="38100" dist="38100" dir="2700000" algn="tl">
+                    <a:srgbClr val="000000">
+                      <a:alpha val="43137"/>
+                    </a:srgbClr>
+                  </a:outerShdw>
+                </a:effectLst>
+                <a:latin typeface="Consolas" pitchFamily="49" charset="0"/>
+              </a:rPr>
+              <a:t>// Attribute should goes to the backing field</a:t>
+            </a:r>
+          </a:p>
+          <a:p>
+            <a:r>
+              <a:rPr lang="en-US" sz="2000" b="1" noProof="1">
+                <a:solidFill>
+                  <a:srgbClr val="8CF4F2"/>
+                </a:solidFill>
+                <a:effectLst>
+                  <a:outerShdw blurRad="38100" dist="38100" dir="2700000" algn="tl">
+                    <a:srgbClr val="000000">
+                      <a:alpha val="43137"/>
+                    </a:srgbClr>
+                  </a:outerShdw>
+                </a:effectLst>
+                <a:latin typeface="Consolas" pitchFamily="49" charset="0"/>
+              </a:rPr>
+              <a:t>public string MySecret { get; set; }</a:t>
+            </a:r>
+          </a:p>
+        </p:txBody>
+      </p:sp>
+    </p:spTree>
+    <p:extLst>
+      <p:ext uri="{BB962C8B-B14F-4D97-AF65-F5344CB8AC3E}">
+        <p14:creationId xmlns:p14="http://schemas.microsoft.com/office/powerpoint/2010/main" val="1649027950"/>
+      </p:ext>
+    </p:extLst>
+  </p:cSld>
+  <p:clrMapOvr>
+    <a:masterClrMapping/>
+  </p:clrMapOvr>
+</p:sld>
+</file>
+
+<file path=ppt/slides/slide54.xml><?xml version="1.0" encoding="utf-8"?>
+<p:sld xmlns:a="http://schemas.openxmlformats.org/drawingml/2006/main" xmlns:r="http://schemas.openxmlformats.org/officeDocument/2006/relationships" xmlns:p="http://schemas.openxmlformats.org/presentationml/2006/main">
+  <p:cSld>
+    <p:spTree>
+      <p:nvGrpSpPr>
+        <p:cNvPr id="1" name=""/>
+        <p:cNvGrpSpPr/>
+        <p:nvPr/>
+      </p:nvGrpSpPr>
+      <p:grpSpPr>
+        <a:xfrm>
+          <a:off x="0" y="0"/>
+          <a:ext cx="0" cy="0"/>
+          <a:chOff x="0" y="0"/>
+          <a:chExt cx="0" cy="0"/>
+        </a:xfrm>
+      </p:grpSpPr>
+      <p:sp>
+        <p:nvSpPr>
+          <p:cNvPr id="4" name="Title 3"/>
+          <p:cNvSpPr>
+            <a:spLocks noGrp="1"/>
+          </p:cNvSpPr>
+          <p:nvPr>
+            <p:ph type="title"/>
+          </p:nvPr>
+        </p:nvSpPr>
+        <p:spPr>
+          <a:xfrm>
+            <a:off x="912812" y="533400"/>
+            <a:ext cx="10363200" cy="1402298"/>
+          </a:xfrm>
+        </p:spPr>
+        <p:txBody>
+          <a:bodyPr/>
+          <a:lstStyle/>
+          <a:p>
+            <a:r>
+              <a:rPr lang="en-US" sz="9600" dirty="0">
+                <a:effectLst>
+                  <a:outerShdw blurRad="38100" dist="38100" dir="2700000" algn="tl">
+                    <a:srgbClr val="000000">
+                      <a:alpha val="43137"/>
+                    </a:srgbClr>
+                  </a:outerShdw>
+                </a:effectLst>
+              </a:rPr>
+              <a:t>Questions?</a:t>
+            </a:r>
+          </a:p>
+        </p:txBody>
+      </p:sp>
+      <p:sp>
+        <p:nvSpPr>
+          <p:cNvPr id="2" name="Slide Number Placeholder 1"/>
+          <p:cNvSpPr>
+            <a:spLocks noGrp="1"/>
+          </p:cNvSpPr>
+          <p:nvPr>
+            <p:ph type="sldNum" sz="quarter" idx="4294967295"/>
+          </p:nvPr>
+        </p:nvSpPr>
+        <p:spPr>
+          <a:xfrm>
+            <a:off x="11760200" y="6524625"/>
+            <a:ext cx="428625" cy="196850"/>
+          </a:xfrm>
+        </p:spPr>
+        <p:txBody>
+          <a:bodyPr/>
+          <a:lstStyle/>
+          <a:p>
+            <a:fld id="{C014DD1E-5D91-48A3-AD6D-45FBA980D106}" type="slidenum">
+              <a:rPr lang="en-US" smtClean="0"/>
+              <a:pPr/>
+              <a:t>54</a:t>
             </a:fld>
             <a:endParaRPr lang="en-US" dirty="0"/>
           </a:p>
@@ -18341,7 +20618,7 @@
         </p:blipFill>
         <p:spPr>
           <a:xfrm>
-            <a:off x="2893565" y="2132251"/>
+            <a:off x="2893565" y="2057400"/>
             <a:ext cx="6401693" cy="4334480"/>
           </a:xfrm>
           <a:prstGeom prst="rect">
@@ -18362,7 +20639,7 @@
 </p:sld>
 </file>
 
-<file path=ppt/slides/slide51.xml><?xml version="1.0" encoding="utf-8"?>
+<file path=ppt/slides/slide55.xml><?xml version="1.0" encoding="utf-8"?>
 <p:sld xmlns:a="http://schemas.openxmlformats.org/drawingml/2006/main" xmlns:r="http://schemas.openxmlformats.org/officeDocument/2006/relationships" xmlns:p="http://schemas.openxmlformats.org/presentationml/2006/main">
   <p:cSld>
     <p:spTree>
@@ -18485,7 +20762,7 @@
             <a:fld id="{C014DD1E-5D91-48A3-AD6D-45FBA980D106}" type="slidenum">
               <a:rPr lang="en-US" smtClean="0"/>
               <a:pPr/>
-              <a:t>51</a:t>
+              <a:t>55</a:t>
             </a:fld>
             <a:endParaRPr lang="en-US" dirty="0"/>
           </a:p>
@@ -18556,7 +20833,7 @@
 </p:sld>
 </file>
 
-<file path=ppt/slides/slide52.xml><?xml version="1.0" encoding="utf-8"?>
+<file path=ppt/slides/slide56.xml><?xml version="1.0" encoding="utf-8"?>
 <p:sld xmlns:a="http://schemas.openxmlformats.org/drawingml/2006/main" xmlns:r="http://schemas.openxmlformats.org/officeDocument/2006/relationships" xmlns:p="http://schemas.openxmlformats.org/presentationml/2006/main">
   <p:cSld>
     <p:spTree>
@@ -20508,6 +22785,49 @@
 </a:theme>
 </file>
 
+<file path=ppt/theme/themeOverride1.xml><?xml version="1.0" encoding="utf-8"?>
+<a:themeOverride xmlns:a="http://schemas.openxmlformats.org/drawingml/2006/main">
+  <a:clrScheme name="SoftUni Color Theme">
+    <a:dk1>
+      <a:sysClr val="windowText" lastClr="000000"/>
+    </a:dk1>
+    <a:lt1>
+      <a:sysClr val="window" lastClr="FFFFFF"/>
+    </a:lt1>
+    <a:dk2>
+      <a:srgbClr val="4E3B30"/>
+    </a:dk2>
+    <a:lt2>
+      <a:srgbClr val="FBEEC9"/>
+    </a:lt2>
+    <a:accent1>
+      <a:srgbClr val="F0A22E"/>
+    </a:accent1>
+    <a:accent2>
+      <a:srgbClr val="A5644E"/>
+    </a:accent2>
+    <a:accent3>
+      <a:srgbClr val="B58B80"/>
+    </a:accent3>
+    <a:accent4>
+      <a:srgbClr val="C3986D"/>
+    </a:accent4>
+    <a:accent5>
+      <a:srgbClr val="A19574"/>
+    </a:accent5>
+    <a:accent6>
+      <a:srgbClr val="C17529"/>
+    </a:accent6>
+    <a:hlink>
+      <a:srgbClr val="F6C781"/>
+    </a:hlink>
+    <a:folHlink>
+      <a:srgbClr val="F2AC44"/>
+    </a:folHlink>
+  </a:clrScheme>
+</a:themeOverride>
+</file>
+
 <file path=customXml/item1.xml><?xml version="1.0" encoding="utf-8"?>
 <?mso-contentType ?>
 <FormTemplates xmlns="http://schemas.microsoft.com/sharepoint/v3/contenttype/forms">

</xml_diff>

<commit_message>
Small fixes in "What is new in CSharp 6.0 and 7.0.pptx"
</commit_message>
<xml_diff>
--- a/docs/What is new in CSharp 6.0 and 7.0.pptx
+++ b/docs/What is new in CSharp 6.0 and 7.0.pptx
@@ -4353,14 +4353,7 @@
           <a:p>
             <a:r>
               <a:rPr lang="en-US" dirty="0"/>
-              <a:t>It can be assigned to via property initializer</a:t>
-            </a:r>
-          </a:p>
-          <a:p>
-            <a:pPr lvl="1"/>
-            <a:r>
-              <a:rPr lang="en-US" dirty="0"/>
-              <a:t>In future releases it will be possible to assign it in the declaring type's constructor body</a:t>
+              <a:t>It can be assigned to via property initializer and in the declaring type's constructor body</a:t>
             </a:r>
           </a:p>
         </p:txBody>
@@ -4764,7 +4757,7 @@
           <a:p>
             <a:r>
               <a:rPr lang="en-US" dirty="0"/>
-              <a:t>Methods as well as user-defined operators and conversions can be given an expression body by use of the “lambda arrow”:</a:t>
+              <a:t>Methods as well as user-defined operators and conversions can be given an expression body by use of the "lambda arrow":</a:t>
             </a:r>
           </a:p>
           <a:p>
@@ -5529,7 +5522,7 @@
               <a:t>Allows specifying a </a:t>
             </a:r>
             <a:r>
-              <a:rPr lang="en-US" u="sng" dirty="0"/>
+              <a:rPr lang="en-US" b="1" dirty="0"/>
               <a:t>static</a:t>
             </a:r>
             <a:r>
@@ -5747,7 +5740,7 @@
                 <a:latin typeface="Consolas" pitchFamily="49" charset="0"/>
                 <a:cs typeface="Consolas" pitchFamily="49" charset="0"/>
               </a:rPr>
-              <a:t>class Program</a:t>
+              <a:t>public static class Program</a:t>
             </a:r>
           </a:p>
           <a:p>
@@ -5785,7 +5778,7 @@
                 <a:latin typeface="Consolas" pitchFamily="49" charset="0"/>
                 <a:cs typeface="Consolas" pitchFamily="49" charset="0"/>
               </a:rPr>
-              <a:t>    static void Main()</a:t>
+              <a:t>    public static void Main()</a:t>
             </a:r>
           </a:p>
           <a:p>
@@ -6014,12 +6007,8 @@
           <a:lstStyle/>
           <a:p>
             <a:r>
-              <a:rPr lang="en-US" dirty="0" err="1"/>
-              <a:t>nameof</a:t>
-            </a:r>
-            <a:r>
-              <a:rPr lang="en-US" dirty="0"/>
-              <a:t> Operator</a:t>
+              <a:rPr lang="en-US" dirty="0"/>
+              <a:t>nameof Operator</a:t>
             </a:r>
           </a:p>
         </p:txBody>
@@ -6051,7 +6040,12 @@
           <a:prstGeom prst="rect">
             <a:avLst/>
           </a:prstGeom>
-          <a:noFill/>
+          <a:ln>
+            <a:noFill/>
+          </a:ln>
+          <a:effectLst>
+            <a:softEdge rad="112500"/>
+          </a:effectLst>
           <a:extLst>
             <a:ext uri="{909E8E84-426E-40DD-AFC4-6F175D3DCCD1}">
               <a14:hiddenFill xmlns:a14="http://schemas.microsoft.com/office/drawing/2010/main">
@@ -6109,12 +6103,8 @@
           <a:lstStyle/>
           <a:p>
             <a:r>
-              <a:rPr lang="en-US" dirty="0" err="1"/>
-              <a:t>nameof</a:t>
-            </a:r>
-            <a:r>
-              <a:rPr lang="en-US" dirty="0"/>
-              <a:t>() Operator</a:t>
+              <a:rPr lang="en-US" dirty="0"/>
+              <a:t>nameof() Operator</a:t>
             </a:r>
           </a:p>
         </p:txBody>
@@ -6256,7 +6246,7 @@
               </a:spcBef>
             </a:pPr>
             <a:r>
-              <a:rPr lang="en-US" sz="3200" b="1" dirty="0" err="1">
+              <a:rPr lang="en-US" sz="3200" b="1" dirty="0">
                 <a:solidFill>
                   <a:srgbClr val="8CF4F2"/>
                 </a:solidFill>
@@ -6677,7 +6667,7 @@
             <a:pPr lvl="1"/>
             <a:r>
               <a:rPr lang="en-US" dirty="0"/>
-              <a:t>13 years of development experience (20 with overtime </a:t>
+              <a:t>13 years of development experience (20 with the overtime </a:t>
             </a:r>
             <a:r>
               <a:rPr lang="en-US" dirty="0">
@@ -6875,12 +6865,24 @@
               <a:t>Replaced with </a:t>
             </a:r>
             <a:r>
-              <a:rPr lang="en-US" dirty="0" err="1"/>
-              <a:t>string.Format</a:t>
-            </a:r>
-            <a:r>
-              <a:rPr lang="en-US" dirty="0"/>
-              <a:t>() during compile-time</a:t>
+              <a:rPr lang="en-US" sz="2800" b="1" dirty="0">
+                <a:solidFill>
+                  <a:srgbClr val="8CF4F2"/>
+                </a:solidFill>
+                <a:effectLst>
+                  <a:outerShdw blurRad="38100" dist="38100" dir="2700000" algn="tl">
+                    <a:srgbClr val="000000">
+                      <a:alpha val="43137"/>
+                    </a:srgbClr>
+                  </a:outerShdw>
+                </a:effectLst>
+                <a:latin typeface="Consolas" pitchFamily="49" charset="0"/>
+              </a:rPr>
+              <a:t>string.Format()</a:t>
+            </a:r>
+            <a:r>
+              <a:rPr lang="en-US" dirty="0"/>
+              <a:t> during compile-time</a:t>
             </a:r>
           </a:p>
           <a:p>
@@ -7420,7 +7422,7 @@
         <p:spPr/>
         <p:txBody>
           <a:bodyPr>
-            <a:normAutofit/>
+            <a:normAutofit lnSpcReduction="10000"/>
           </a:bodyPr>
           <a:lstStyle/>
           <a:p>
@@ -7485,6 +7487,17 @@
               <a:t>Implemented with a "filter" block in CIL</a:t>
             </a:r>
           </a:p>
+          <a:p>
+            <a:pPr lvl="1">
+              <a:spcBef>
+                <a:spcPts val="400"/>
+              </a:spcBef>
+            </a:pPr>
+            <a:r>
+              <a:rPr lang="en-US" dirty="0"/>
+              <a:t>Already available in VB.NET and F#</a:t>
+            </a:r>
+          </a:p>
         </p:txBody>
       </p:sp>
       <p:sp>
@@ -7497,7 +7510,7 @@
         </p:nvSpPr>
         <p:spPr bwMode="auto">
           <a:xfrm>
-            <a:off x="1296055" y="2590800"/>
+            <a:off x="1296055" y="2319278"/>
             <a:ext cx="9596714" cy="2862322"/>
           </a:xfrm>
           <a:prstGeom prst="rect">
@@ -8005,7 +8018,42 @@
                 <a:latin typeface="Consolas" pitchFamily="49" charset="0"/>
                 <a:cs typeface="Consolas" pitchFamily="49" charset="0"/>
               </a:rPr>
-              <a:t>catch (Exception ex) when (Log(ex)) { ... }</a:t>
+              <a:t>catch (Exception ex) </a:t>
+            </a:r>
+            <a:r>
+              <a:rPr lang="en-US" sz="2000" b="1" noProof="1">
+                <a:solidFill>
+                  <a:schemeClr val="accent4">
+                    <a:lumMod val="75000"/>
+                  </a:schemeClr>
+                </a:solidFill>
+                <a:effectLst>
+                  <a:outerShdw blurRad="38100" dist="38100" dir="2700000" algn="tl">
+                    <a:srgbClr val="000000">
+                      <a:alpha val="43137"/>
+                    </a:srgbClr>
+                  </a:outerShdw>
+                </a:effectLst>
+                <a:latin typeface="Consolas" pitchFamily="49" charset="0"/>
+              </a:rPr>
+              <a:t>when (Log(ex)) </a:t>
+            </a:r>
+            <a:r>
+              <a:rPr lang="en-US" sz="2000" b="1" noProof="1">
+                <a:solidFill>
+                  <a:srgbClr val="8CF4F2"/>
+                </a:solidFill>
+                <a:effectLst>
+                  <a:outerShdw blurRad="38100" dist="38100" dir="2700000" algn="tl">
+                    <a:srgbClr val="000000">
+                      <a:alpha val="43137"/>
+                    </a:srgbClr>
+                  </a:outerShdw>
+                </a:effectLst>
+                <a:latin typeface="Consolas" pitchFamily="49" charset="0"/>
+                <a:cs typeface="Consolas" pitchFamily="49" charset="0"/>
+              </a:rPr>
+              <a:t>{ ... }</a:t>
             </a:r>
           </a:p>
           <a:p>
@@ -8445,26 +8493,25 @@
                   </a:outerShdw>
                 </a:effectLst>
                 <a:latin typeface="Consolas" pitchFamily="49" charset="0"/>
+              </a:rPr>
+              <a:t>?.</a:t>
+            </a:r>
+            <a:r>
+              <a:rPr lang="en-US" sz="2000" b="1" noProof="1">
+                <a:solidFill>
+                  <a:srgbClr val="8CF4F2"/>
+                </a:solidFill>
+                <a:effectLst>
+                  <a:outerShdw blurRad="38100" dist="38100" dir="2700000" algn="tl">
+                    <a:srgbClr val="000000">
+                      <a:alpha val="43137"/>
+                    </a:srgbClr>
+                  </a:outerShdw>
+                </a:effectLst>
+                <a:latin typeface="Consolas" pitchFamily="49" charset="0"/>
                 <a:cs typeface="Consolas" pitchFamily="49" charset="0"/>
               </a:rPr>
-              <a:t>?</a:t>
-            </a:r>
-            <a:r>
-              <a:rPr lang="en-US" sz="2000" b="1" noProof="1">
-                <a:solidFill>
-                  <a:srgbClr val="8CF4F2"/>
-                </a:solidFill>
-                <a:effectLst>
-                  <a:outerShdw blurRad="38100" dist="38100" dir="2700000" algn="tl">
-                    <a:srgbClr val="000000">
-                      <a:alpha val="43137"/>
-                    </a:srgbClr>
-                  </a:outerShdw>
-                </a:effectLst>
-                <a:latin typeface="Consolas" pitchFamily="49" charset="0"/>
-                <a:cs typeface="Consolas" pitchFamily="49" charset="0"/>
-              </a:rPr>
-              <a:t>.Length; // null if customers is null</a:t>
+              <a:t>Length; // null if customers is null</a:t>
             </a:r>
           </a:p>
           <a:p>
@@ -8500,26 +8547,25 @@
                   </a:outerShdw>
                 </a:effectLst>
                 <a:latin typeface="Consolas" pitchFamily="49" charset="0"/>
+              </a:rPr>
+              <a:t>?[</a:t>
+            </a:r>
+            <a:r>
+              <a:rPr lang="en-US" sz="2000" b="1" noProof="1">
+                <a:solidFill>
+                  <a:srgbClr val="8CF4F2"/>
+                </a:solidFill>
+                <a:effectLst>
+                  <a:outerShdw blurRad="38100" dist="38100" dir="2700000" algn="tl">
+                    <a:srgbClr val="000000">
+                      <a:alpha val="43137"/>
+                    </a:srgbClr>
+                  </a:outerShdw>
+                </a:effectLst>
+                <a:latin typeface="Consolas" pitchFamily="49" charset="0"/>
                 <a:cs typeface="Consolas" pitchFamily="49" charset="0"/>
               </a:rPr>
-              <a:t>?</a:t>
-            </a:r>
-            <a:r>
-              <a:rPr lang="en-US" sz="2000" b="1" noProof="1">
-                <a:solidFill>
-                  <a:srgbClr val="8CF4F2"/>
-                </a:solidFill>
-                <a:effectLst>
-                  <a:outerShdw blurRad="38100" dist="38100" dir="2700000" algn="tl">
-                    <a:srgbClr val="000000">
-                      <a:alpha val="43137"/>
-                    </a:srgbClr>
-                  </a:outerShdw>
-                </a:effectLst>
-                <a:latin typeface="Consolas" pitchFamily="49" charset="0"/>
-                <a:cs typeface="Consolas" pitchFamily="49" charset="0"/>
-              </a:rPr>
-              <a:t>[0]; // null if customers is null</a:t>
+              <a:t>0]; // null if customers is null</a:t>
             </a:r>
           </a:p>
         </p:txBody>
@@ -8594,9 +8640,43 @@
                   </a:outerShdw>
                 </a:effectLst>
                 <a:latin typeface="Consolas" pitchFamily="49" charset="0"/>
+              </a:rPr>
+              <a:t>?.</a:t>
+            </a:r>
+            <a:r>
+              <a:rPr lang="en-US" sz="2000" b="1" noProof="1">
+                <a:solidFill>
+                  <a:srgbClr val="8CF4F2"/>
+                </a:solidFill>
+                <a:effectLst>
+                  <a:outerShdw blurRad="38100" dist="38100" dir="2700000" algn="tl">
+                    <a:srgbClr val="000000">
+                      <a:alpha val="43137"/>
+                    </a:srgbClr>
+                  </a:outerShdw>
+                </a:effectLst>
+                <a:latin typeface="Consolas" pitchFamily="49" charset="0"/>
                 <a:cs typeface="Consolas" pitchFamily="49" charset="0"/>
               </a:rPr>
-              <a:t>?</a:t>
+              <a:t>Length </a:t>
+            </a:r>
+            <a:r>
+              <a:rPr lang="en-US" sz="2000" b="1" noProof="1">
+                <a:solidFill>
+                  <a:schemeClr val="accent4">
+                    <a:lumMod val="75000"/>
+                  </a:schemeClr>
+                </a:solidFill>
+                <a:effectLst>
+                  <a:outerShdw blurRad="38100" dist="38100" dir="2700000" algn="tl">
+                    <a:srgbClr val="000000">
+                      <a:alpha val="43137"/>
+                    </a:srgbClr>
+                  </a:outerShdw>
+                </a:effectLst>
+                <a:latin typeface="Consolas" pitchFamily="49" charset="0"/>
+              </a:rPr>
+              <a:t>??</a:t>
             </a:r>
             <a:r>
               <a:rPr lang="en-US" sz="2000" b="1" noProof="1">
@@ -8613,7 +8693,7 @@
                 <a:latin typeface="Consolas" pitchFamily="49" charset="0"/>
                 <a:cs typeface="Consolas" pitchFamily="49" charset="0"/>
               </a:rPr>
-              <a:t>.Length ?? 0; // 0 if customers is null</a:t>
+              <a:t> 0; // 0 if customers is null</a:t>
             </a:r>
           </a:p>
         </p:txBody>
@@ -8688,26 +8768,25 @@
                   </a:outerShdw>
                 </a:effectLst>
                 <a:latin typeface="Consolas" pitchFamily="49" charset="0"/>
+              </a:rPr>
+              <a:t>?[</a:t>
+            </a:r>
+            <a:r>
+              <a:rPr lang="en-US" sz="2000" b="1" noProof="1">
+                <a:solidFill>
+                  <a:srgbClr val="8CF4F2"/>
+                </a:solidFill>
+                <a:effectLst>
+                  <a:outerShdw blurRad="38100" dist="38100" dir="2700000" algn="tl">
+                    <a:srgbClr val="000000">
+                      <a:alpha val="43137"/>
+                    </a:srgbClr>
+                  </a:outerShdw>
+                </a:effectLst>
+                <a:latin typeface="Consolas" pitchFamily="49" charset="0"/>
                 <a:cs typeface="Consolas" pitchFamily="49" charset="0"/>
               </a:rPr>
-              <a:t>?</a:t>
-            </a:r>
-            <a:r>
-              <a:rPr lang="en-US" sz="2000" b="1" noProof="1">
-                <a:solidFill>
-                  <a:srgbClr val="8CF4F2"/>
-                </a:solidFill>
-                <a:effectLst>
-                  <a:outerShdw blurRad="38100" dist="38100" dir="2700000" algn="tl">
-                    <a:srgbClr val="000000">
-                      <a:alpha val="43137"/>
-                    </a:srgbClr>
-                  </a:outerShdw>
-                </a:effectLst>
-                <a:latin typeface="Consolas" pitchFamily="49" charset="0"/>
-                <a:cs typeface="Consolas" pitchFamily="49" charset="0"/>
-              </a:rPr>
-              <a:t>[0].Orders</a:t>
+              <a:t>0].Orders</a:t>
             </a:r>
             <a:r>
               <a:rPr lang="en-US" sz="2000" b="1" noProof="1">
@@ -8724,26 +8803,25 @@
                   </a:outerShdw>
                 </a:effectLst>
                 <a:latin typeface="Consolas" pitchFamily="49" charset="0"/>
+              </a:rPr>
+              <a:t>?.</a:t>
+            </a:r>
+            <a:r>
+              <a:rPr lang="en-US" sz="2000" b="1" noProof="1">
+                <a:solidFill>
+                  <a:srgbClr val="8CF4F2"/>
+                </a:solidFill>
+                <a:effectLst>
+                  <a:outerShdw blurRad="38100" dist="38100" dir="2700000" algn="tl">
+                    <a:srgbClr val="000000">
+                      <a:alpha val="43137"/>
+                    </a:srgbClr>
+                  </a:outerShdw>
+                </a:effectLst>
+                <a:latin typeface="Consolas" pitchFamily="49" charset="0"/>
                 <a:cs typeface="Consolas" pitchFamily="49" charset="0"/>
               </a:rPr>
-              <a:t>?</a:t>
-            </a:r>
-            <a:r>
-              <a:rPr lang="en-US" sz="2000" b="1" noProof="1">
-                <a:solidFill>
-                  <a:srgbClr val="8CF4F2"/>
-                </a:solidFill>
-                <a:effectLst>
-                  <a:outerShdw blurRad="38100" dist="38100" dir="2700000" algn="tl">
-                    <a:srgbClr val="000000">
-                      <a:alpha val="43137"/>
-                    </a:srgbClr>
-                  </a:outerShdw>
-                </a:effectLst>
-                <a:latin typeface="Consolas" pitchFamily="49" charset="0"/>
-                <a:cs typeface="Consolas" pitchFamily="49" charset="0"/>
-              </a:rPr>
-              <a:t>.Count();</a:t>
+              <a:t>Count();</a:t>
             </a:r>
           </a:p>
         </p:txBody>
@@ -10136,12 +10214,8 @@
               </a:lnSpc>
             </a:pPr>
             <a:r>
-              <a:rPr lang="en-US" dirty="0" err="1"/>
-              <a:t>nameof</a:t>
-            </a:r>
-            <a:r>
-              <a:rPr lang="en-US" dirty="0"/>
-              <a:t>, Expression Bodies, using static, etc.</a:t>
+              <a:rPr lang="en-US" dirty="0"/>
+              <a:t>nameof, Expression Bodies, using static, etc.</a:t>
             </a:r>
             <a:endParaRPr lang="bg-BG" dirty="0"/>
           </a:p>
@@ -10446,8 +10520,8 @@
         </p:blipFill>
         <p:spPr>
           <a:xfrm>
-            <a:off x="6187237" y="1188672"/>
-            <a:ext cx="6001588" cy="5258534"/>
+            <a:off x="6018212" y="1190821"/>
+            <a:ext cx="6170613" cy="5406632"/>
           </a:xfrm>
           <a:prstGeom prst="rect">
             <a:avLst/>
@@ -10692,10 +10766,26 @@
                 <a:latin typeface="Consolas" pitchFamily="49" charset="0"/>
                 <a:cs typeface="Consolas" pitchFamily="49" charset="0"/>
               </a:rPr>
-              <a:t>public Resource() =&gt; Console.WriteLine($"Constructing...");</a:t>
-            </a:r>
-          </a:p>
-          <a:p>
+              <a:t>public Resource()</a:t>
+            </a:r>
+            <a:r>
+              <a:rPr lang="en-US" sz="2000" b="1" noProof="1">
+                <a:solidFill>
+                  <a:schemeClr val="accent4">
+                    <a:lumMod val="75000"/>
+                  </a:schemeClr>
+                </a:solidFill>
+                <a:effectLst>
+                  <a:outerShdw blurRad="38100" dist="38100" dir="2700000" algn="tl">
+                    <a:srgbClr val="000000">
+                      <a:alpha val="43137"/>
+                    </a:srgbClr>
+                  </a:outerShdw>
+                </a:effectLst>
+                <a:latin typeface="Consolas" pitchFamily="49" charset="0"/>
+              </a:rPr>
+              <a:t> =&gt; </a:t>
+            </a:r>
             <a:r>
               <a:rPr lang="en-US" sz="2000" b="1" noProof="1">
                 <a:solidFill>
@@ -10711,7 +10801,61 @@
                 <a:latin typeface="Consolas" pitchFamily="49" charset="0"/>
                 <a:cs typeface="Consolas" pitchFamily="49" charset="0"/>
               </a:rPr>
-              <a:t>~Resource() =&gt; Console.WriteLine("Destructing...");</a:t>
+              <a:t>Console.WriteLine($"Constructing...");</a:t>
+            </a:r>
+          </a:p>
+          <a:p>
+            <a:r>
+              <a:rPr lang="en-US" sz="2000" b="1" noProof="1">
+                <a:solidFill>
+                  <a:srgbClr val="8CF4F2"/>
+                </a:solidFill>
+                <a:effectLst>
+                  <a:outerShdw blurRad="38100" dist="38100" dir="2700000" algn="tl">
+                    <a:srgbClr val="000000">
+                      <a:alpha val="43137"/>
+                    </a:srgbClr>
+                  </a:outerShdw>
+                </a:effectLst>
+                <a:latin typeface="Consolas" pitchFamily="49" charset="0"/>
+                <a:cs typeface="Consolas" pitchFamily="49" charset="0"/>
+              </a:rPr>
+              <a:t>~Resource()</a:t>
+            </a:r>
+            <a:r>
+              <a:rPr lang="en-US" sz="2000" b="1" noProof="1">
+                <a:solidFill>
+                  <a:schemeClr val="accent4">
+                    <a:lumMod val="75000"/>
+                  </a:schemeClr>
+                </a:solidFill>
+                <a:effectLst>
+                  <a:outerShdw blurRad="38100" dist="38100" dir="2700000" algn="tl">
+                    <a:srgbClr val="000000">
+                      <a:alpha val="43137"/>
+                    </a:srgbClr>
+                  </a:outerShdw>
+                </a:effectLst>
+                <a:latin typeface="Consolas" pitchFamily="49" charset="0"/>
+              </a:rPr>
+              <a:t> =&gt; </a:t>
+            </a:r>
+            <a:r>
+              <a:rPr lang="en-US" sz="2000" b="1" noProof="1">
+                <a:solidFill>
+                  <a:srgbClr val="8CF4F2"/>
+                </a:solidFill>
+                <a:effectLst>
+                  <a:outerShdw blurRad="38100" dist="38100" dir="2700000" algn="tl">
+                    <a:srgbClr val="000000">
+                      <a:alpha val="43137"/>
+                    </a:srgbClr>
+                  </a:outerShdw>
+                </a:effectLst>
+                <a:latin typeface="Consolas" pitchFamily="49" charset="0"/>
+                <a:cs typeface="Consolas" pitchFamily="49" charset="0"/>
+              </a:rPr>
+              <a:t>Console.WriteLine("Destructing...");</a:t>
             </a:r>
             <a:endParaRPr lang="bg-BG" sz="2000" b="1" noProof="1">
               <a:solidFill>
@@ -10782,10 +10926,26 @@
                 <a:latin typeface="Consolas" pitchFamily="49" charset="0"/>
                 <a:cs typeface="Consolas" pitchFamily="49" charset="0"/>
               </a:rPr>
-              <a:t>    get =&gt; this.x;</a:t>
-            </a:r>
-          </a:p>
-          <a:p>
+              <a:t>    get</a:t>
+            </a:r>
+            <a:r>
+              <a:rPr lang="en-US" sz="2000" b="1" noProof="1">
+                <a:solidFill>
+                  <a:schemeClr val="accent4">
+                    <a:lumMod val="75000"/>
+                  </a:schemeClr>
+                </a:solidFill>
+                <a:effectLst>
+                  <a:outerShdw blurRad="38100" dist="38100" dir="2700000" algn="tl">
+                    <a:srgbClr val="000000">
+                      <a:alpha val="43137"/>
+                    </a:srgbClr>
+                  </a:outerShdw>
+                </a:effectLst>
+                <a:latin typeface="Consolas" pitchFamily="49" charset="0"/>
+              </a:rPr>
+              <a:t> =&gt; </a:t>
+            </a:r>
             <a:r>
               <a:rPr lang="en-US" sz="2000" b="1" noProof="1">
                 <a:solidFill>
@@ -10801,7 +10961,7 @@
                 <a:latin typeface="Consolas" pitchFamily="49" charset="0"/>
                 <a:cs typeface="Consolas" pitchFamily="49" charset="0"/>
               </a:rPr>
-              <a:t>    set =&gt; this.x = value;</a:t>
+              <a:t>this.x;</a:t>
             </a:r>
           </a:p>
           <a:p>
@@ -10820,6 +10980,60 @@
                 <a:latin typeface="Consolas" pitchFamily="49" charset="0"/>
                 <a:cs typeface="Consolas" pitchFamily="49" charset="0"/>
               </a:rPr>
+              <a:t>    set</a:t>
+            </a:r>
+            <a:r>
+              <a:rPr lang="en-US" sz="2000" b="1" noProof="1">
+                <a:solidFill>
+                  <a:schemeClr val="accent4">
+                    <a:lumMod val="75000"/>
+                  </a:schemeClr>
+                </a:solidFill>
+                <a:effectLst>
+                  <a:outerShdw blurRad="38100" dist="38100" dir="2700000" algn="tl">
+                    <a:srgbClr val="000000">
+                      <a:alpha val="43137"/>
+                    </a:srgbClr>
+                  </a:outerShdw>
+                </a:effectLst>
+                <a:latin typeface="Consolas" pitchFamily="49" charset="0"/>
+              </a:rPr>
+              <a:t> =&gt; </a:t>
+            </a:r>
+            <a:r>
+              <a:rPr lang="en-US" sz="2000" b="1" noProof="1">
+                <a:solidFill>
+                  <a:srgbClr val="8CF4F2"/>
+                </a:solidFill>
+                <a:effectLst>
+                  <a:outerShdw blurRad="38100" dist="38100" dir="2700000" algn="tl">
+                    <a:srgbClr val="000000">
+                      <a:alpha val="43137"/>
+                    </a:srgbClr>
+                  </a:outerShdw>
+                </a:effectLst>
+                <a:latin typeface="Consolas" pitchFamily="49" charset="0"/>
+                <a:cs typeface="Consolas" pitchFamily="49" charset="0"/>
+              </a:rPr>
+              <a:t>this.x = value;</a:t>
+            </a:r>
+          </a:p>
+          <a:p>
+            <a:r>
+              <a:rPr lang="en-US" sz="2000" b="1" noProof="1">
+                <a:solidFill>
+                  <a:srgbClr val="8CF4F2"/>
+                </a:solidFill>
+                <a:effectLst>
+                  <a:outerShdw blurRad="38100" dist="38100" dir="2700000" algn="tl">
+                    <a:srgbClr val="000000">
+                      <a:alpha val="43137"/>
+                    </a:srgbClr>
+                  </a:outerShdw>
+                </a:effectLst>
+                <a:latin typeface="Consolas" pitchFamily="49" charset="0"/>
+                <a:cs typeface="Consolas" pitchFamily="49" charset="0"/>
+              </a:rPr>
               <a:t>}</a:t>
             </a:r>
           </a:p>
@@ -10877,10 +11091,26 @@
                 <a:latin typeface="Consolas" pitchFamily="49" charset="0"/>
                 <a:cs typeface="Consolas" pitchFamily="49" charset="0"/>
               </a:rPr>
-              <a:t>    add =&gt; this.toStringCalledEventHandler += value;</a:t>
-            </a:r>
-          </a:p>
-          <a:p>
+              <a:t>    add</a:t>
+            </a:r>
+            <a:r>
+              <a:rPr lang="en-US" sz="2000" b="1" noProof="1">
+                <a:solidFill>
+                  <a:schemeClr val="accent4">
+                    <a:lumMod val="75000"/>
+                  </a:schemeClr>
+                </a:solidFill>
+                <a:effectLst>
+                  <a:outerShdw blurRad="38100" dist="38100" dir="2700000" algn="tl">
+                    <a:srgbClr val="000000">
+                      <a:alpha val="43137"/>
+                    </a:srgbClr>
+                  </a:outerShdw>
+                </a:effectLst>
+                <a:latin typeface="Consolas" pitchFamily="49" charset="0"/>
+              </a:rPr>
+              <a:t> =&gt; </a:t>
+            </a:r>
             <a:r>
               <a:rPr lang="en-US" sz="2000" b="1" noProof="1">
                 <a:solidFill>
@@ -10896,7 +11126,61 @@
                 <a:latin typeface="Consolas" pitchFamily="49" charset="0"/>
                 <a:cs typeface="Consolas" pitchFamily="49" charset="0"/>
               </a:rPr>
-              <a:t>    remove =&gt; this.toStringCalledEventHandler -= value;</a:t>
+              <a:t>this.toStringCalledEventHandler += value;</a:t>
+            </a:r>
+          </a:p>
+          <a:p>
+            <a:r>
+              <a:rPr lang="en-US" sz="2000" b="1" noProof="1">
+                <a:solidFill>
+                  <a:srgbClr val="8CF4F2"/>
+                </a:solidFill>
+                <a:effectLst>
+                  <a:outerShdw blurRad="38100" dist="38100" dir="2700000" algn="tl">
+                    <a:srgbClr val="000000">
+                      <a:alpha val="43137"/>
+                    </a:srgbClr>
+                  </a:outerShdw>
+                </a:effectLst>
+                <a:latin typeface="Consolas" pitchFamily="49" charset="0"/>
+                <a:cs typeface="Consolas" pitchFamily="49" charset="0"/>
+              </a:rPr>
+              <a:t>    remove</a:t>
+            </a:r>
+            <a:r>
+              <a:rPr lang="en-US" sz="2000" b="1" noProof="1">
+                <a:solidFill>
+                  <a:schemeClr val="accent4">
+                    <a:lumMod val="75000"/>
+                  </a:schemeClr>
+                </a:solidFill>
+                <a:effectLst>
+                  <a:outerShdw blurRad="38100" dist="38100" dir="2700000" algn="tl">
+                    <a:srgbClr val="000000">
+                      <a:alpha val="43137"/>
+                    </a:srgbClr>
+                  </a:outerShdw>
+                </a:effectLst>
+                <a:latin typeface="Consolas" pitchFamily="49" charset="0"/>
+              </a:rPr>
+              <a:t> =&gt; </a:t>
+            </a:r>
+            <a:r>
+              <a:rPr lang="en-US" sz="2000" b="1" noProof="1">
+                <a:solidFill>
+                  <a:srgbClr val="8CF4F2"/>
+                </a:solidFill>
+                <a:effectLst>
+                  <a:outerShdw blurRad="38100" dist="38100" dir="2700000" algn="tl">
+                    <a:srgbClr val="000000">
+                      <a:alpha val="43137"/>
+                    </a:srgbClr>
+                  </a:outerShdw>
+                </a:effectLst>
+                <a:latin typeface="Consolas" pitchFamily="49" charset="0"/>
+                <a:cs typeface="Consolas" pitchFamily="49" charset="0"/>
+              </a:rPr>
+              <a:t>this.toStringCalledEventHandler -= value;</a:t>
             </a:r>
           </a:p>
           <a:p>
@@ -13520,7 +13804,7 @@
           <a:p>
             <a:r>
               <a:rPr lang="en-US" dirty="0"/>
-              <a:t>C# 7.0 is enhancing two existing constructs with patterns "is" expressions and switch statements (more to come)</a:t>
+              <a:t>C# 7.0 is enhancing two existing constructs with patterns: "is" expressions and switch statements (more to come)</a:t>
             </a:r>
           </a:p>
           <a:p>
@@ -14244,7 +14528,7 @@
                 <a:latin typeface="Consolas" pitchFamily="49" charset="0"/>
                 <a:cs typeface="Consolas" pitchFamily="49" charset="0"/>
               </a:rPr>
-              <a:t>: break; // rectangle discarding the variable</a:t>
+              <a:t>: break; // rectangle, discarding the variable</a:t>
             </a:r>
           </a:p>
           <a:p>
@@ -15075,7 +15359,7 @@
           <a:p>
             <a:r>
               <a:rPr lang="en-US" dirty="0"/>
-              <a:t>Can also be used in variables</a:t>
+              <a:t>Can also be used in variables (deconstruction)</a:t>
             </a:r>
           </a:p>
         </p:txBody>
@@ -18580,7 +18864,7 @@
           <a:p>
             <a:r>
               <a:rPr lang="en-US" dirty="0" err="1"/>
-              <a:t>Async</a:t>
+              <a:t>async</a:t>
             </a:r>
             <a:r>
               <a:rPr lang="en-US" dirty="0"/>
@@ -18606,7 +18890,7 @@
           <a:p>
             <a:r>
               <a:rPr lang="en-US" dirty="0"/>
-              <a:t>Nullable-Enhanced Common Type</a:t>
+              <a:t>Nullable-enhanced common type</a:t>
             </a:r>
             <a:endParaRPr lang="bg-BG" dirty="0"/>
           </a:p>
@@ -20026,7 +20310,7 @@
           <a:p>
             <a:r>
               <a:rPr lang="en-US" dirty="0"/>
-              <a:t>Mix Declarations and Variables in Deconstruction</a:t>
+              <a:t>Mix declarations and variables in deconstruction</a:t>
             </a:r>
           </a:p>
           <a:p>
@@ -20053,7 +20337,7 @@
           <a:p>
             <a:r>
               <a:rPr lang="en-US" dirty="0"/>
-              <a:t>Auto-Implemented Property Field-Targeted Attributes</a:t>
+              <a:t>Auto-Implemented property field-targeted attributes</a:t>
             </a:r>
           </a:p>
         </p:txBody>
@@ -20485,7 +20769,7 @@
                 </a:effectLst>
                 <a:latin typeface="Consolas" pitchFamily="49" charset="0"/>
               </a:rPr>
-              <a:t>// Attribute should goes to the backing field</a:t>
+              <a:t>// This attribute goes to the backing field</a:t>
             </a:r>
           </a:p>
           <a:p>
@@ -20503,7 +20787,7 @@
                 </a:effectLst>
                 <a:latin typeface="Consolas" pitchFamily="49" charset="0"/>
               </a:rPr>
-              <a:t>public string MySecret { get; set; }</a:t>
+              <a:t>public string MyProperty { get; set; }</a:t>
             </a:r>
           </a:p>
         </p:txBody>
@@ -21302,12 +21586,8 @@
           </a:p>
           <a:p>
             <a:r>
-              <a:rPr lang="en-US" dirty="0" err="1"/>
-              <a:t>nameof</a:t>
-            </a:r>
-            <a:r>
-              <a:rPr lang="en-US" dirty="0"/>
-              <a:t> Operator</a:t>
+              <a:rPr lang="en-US" dirty="0"/>
+              <a:t>nameof Operator</a:t>
             </a:r>
           </a:p>
           <a:p>

</xml_diff>